<commit_message>
Added memory use to spreadsheet and slides. Added javadoc to ClassDataSharing.
</commit_message>
<xml_diff>
--- a/jlink/Helidon-JRE.pptx
+++ b/jlink/Helidon-JRE.pptx
@@ -214,7 +214,7 @@
           <a:p>
             <a:fld id="{AF36B9BF-6606-E149-B747-1C4023F32936}" type="datetimeFigureOut">
               <a:rPr lang="en-US" smtClean="0"/>
-              <a:t>11/5/19</a:t>
+              <a:t>11/6/19</a:t>
             </a:fld>
             <a:endParaRPr lang="en-US"/>
           </a:p>
@@ -380,7 +380,7 @@
           <a:p>
             <a:fld id="{266683A9-C285-3649-87A6-5CDE9A34971C}" type="datetimeFigureOut">
               <a:rPr lang="en-US" smtClean="0"/>
-              <a:t>11/5/19</a:t>
+              <a:t>11/6/19</a:t>
             </a:fld>
             <a:endParaRPr lang="en-US"/>
           </a:p>
@@ -1020,6 +1020,80 @@
             <a:r>
               <a:rPr lang="en-US" sz="1050" dirty="0" smtClean="0"/>
               <a:t> </a:t>
+            </a:r>
+            <a:endParaRPr lang="en-US" sz="1050" dirty="0" smtClean="0"/>
+          </a:p>
+          <a:p>
+            <a:pPr marL="228600" indent="-228600">
+              <a:buAutoNum type="arabicPeriod"/>
+            </a:pPr>
+            <a:r>
+              <a:rPr lang="en-US" sz="1050" dirty="0" smtClean="0"/>
+              <a:t>Memory is</a:t>
+            </a:r>
+            <a:r>
+              <a:rPr lang="en-US" sz="1050" baseline="0" dirty="0" smtClean="0"/>
+              <a:t> average of 5 runs of </a:t>
+            </a:r>
+            <a:r>
+              <a:rPr lang="en-US" sz="1050" baseline="0" dirty="0" err="1" smtClean="0">
+                <a:latin typeface="Consolas" charset="0"/>
+                <a:ea typeface="Consolas" charset="0"/>
+                <a:cs typeface="Consolas" charset="0"/>
+              </a:rPr>
+              <a:t>ps</a:t>
+            </a:r>
+            <a:r>
+              <a:rPr lang="en-US" sz="1050" dirty="0" smtClean="0">
+                <a:latin typeface="Consolas" charset="0"/>
+                <a:ea typeface="Consolas" charset="0"/>
+                <a:cs typeface="Consolas" charset="0"/>
+              </a:rPr>
+              <a:t> -o </a:t>
+            </a:r>
+            <a:r>
+              <a:rPr lang="en-US" sz="1050" dirty="0" err="1" smtClean="0">
+                <a:latin typeface="Consolas" charset="0"/>
+                <a:ea typeface="Consolas" charset="0"/>
+                <a:cs typeface="Consolas" charset="0"/>
+              </a:rPr>
+              <a:t>rss</a:t>
+            </a:r>
+            <a:r>
+              <a:rPr lang="en-US" sz="1050" dirty="0" smtClean="0">
+                <a:latin typeface="Consolas" charset="0"/>
+                <a:ea typeface="Consolas" charset="0"/>
+                <a:cs typeface="Consolas" charset="0"/>
+              </a:rPr>
+              <a:t> -p ${</a:t>
+            </a:r>
+            <a:r>
+              <a:rPr lang="en-US" sz="1050" dirty="0" err="1" smtClean="0">
+                <a:latin typeface="Consolas" charset="0"/>
+                <a:ea typeface="Consolas" charset="0"/>
+                <a:cs typeface="Consolas" charset="0"/>
+              </a:rPr>
+              <a:t>pid</a:t>
+            </a:r>
+            <a:r>
+              <a:rPr lang="en-US" sz="1050" dirty="0" smtClean="0">
+                <a:latin typeface="Consolas" charset="0"/>
+                <a:ea typeface="Consolas" charset="0"/>
+                <a:cs typeface="Consolas" charset="0"/>
+              </a:rPr>
+              <a:t>}</a:t>
+            </a:r>
+            <a:r>
+              <a:rPr lang="en-US" sz="1050" baseline="0" dirty="0" smtClean="0"/>
+              <a:t> (</a:t>
+            </a:r>
+            <a:r>
+              <a:rPr lang="en-US" sz="1050" baseline="0" dirty="0" smtClean="0"/>
+              <a:t>resident </a:t>
+            </a:r>
+            <a:r>
+              <a:rPr lang="en-US" sz="1050" baseline="0" smtClean="0"/>
+              <a:t>set size)</a:t>
             </a:r>
             <a:endParaRPr lang="en-US" dirty="0"/>
           </a:p>
@@ -4422,21 +4496,21 @@
       </p:sp>
       <p:graphicFrame>
         <p:nvGraphicFramePr>
-          <p:cNvPr id="12" name="Table 11"/>
+          <p:cNvPr id="3" name="Table 2"/>
           <p:cNvGraphicFramePr>
             <a:graphicFrameLocks noGrp="1"/>
           </p:cNvGraphicFramePr>
           <p:nvPr>
             <p:extLst>
               <p:ext uri="{D42A27DB-BD31-4B8C-83A1-F6EECF244321}">
-                <p14:modId xmlns:p14="http://schemas.microsoft.com/office/powerpoint/2010/main" val="1610558465"/>
+                <p14:modId xmlns:p14="http://schemas.microsoft.com/office/powerpoint/2010/main" val="1003717632"/>
               </p:ext>
             </p:extLst>
           </p:nvPr>
         </p:nvGraphicFramePr>
         <p:xfrm>
-          <a:off x="971550" y="1576388"/>
-          <a:ext cx="10013507" cy="4593017"/>
+          <a:off x="958850" y="1555750"/>
+          <a:ext cx="10077449" cy="4673600"/>
         </p:xfrm>
         <a:graphic>
           <a:graphicData uri="http://schemas.openxmlformats.org/drawingml/2006/table">
@@ -4445,13 +4519,14 @@
                 <a:tableStyleId>{5C22544A-7EE6-4342-B048-85BDC9FD1C3A}</a:tableStyleId>
               </a:tblPr>
               <a:tblGrid>
-                <a:gridCol w="2813050"/>
-                <a:gridCol w="1066356"/>
-                <a:gridCol w="1587500"/>
-                <a:gridCol w="495300"/>
-                <a:gridCol w="4051301"/>
+                <a:gridCol w="2756333"/>
+                <a:gridCol w="1147432"/>
+                <a:gridCol w="1247209"/>
+                <a:gridCol w="1110016"/>
+                <a:gridCol w="212025"/>
+                <a:gridCol w="3604434"/>
               </a:tblGrid>
-              <a:tr h="310129">
+              <a:tr h="311150">
                 <a:tc>
                   <a:txBody>
                     <a:bodyPr/>
@@ -4459,18 +4534,12 @@
                     <a:p>
                       <a:pPr algn="l" fontAlgn="b"/>
                       <a:r>
-                        <a:rPr lang="en-US" sz="1800" b="1" u="none" strike="noStrike" dirty="0">
-                          <a:effectLst/>
-                        </a:rPr>
-                        <a:t>Server </a:t>
-                      </a:r>
-                      <a:r>
-                        <a:rPr lang="en-US" sz="1800" b="1" u="none" strike="noStrike" dirty="0" smtClean="0">
-                          <a:effectLst/>
-                        </a:rPr>
-                        <a:t>Variant</a:t>
-                      </a:r>
-                      <a:endParaRPr lang="en-US" sz="1800" b="1" i="0" u="none" strike="noStrike" dirty="0">
+                        <a:rPr lang="en-US" sz="2000" b="1" u="none" strike="noStrike" dirty="0">
+                          <a:effectLst/>
+                        </a:rPr>
+                        <a:t>Server Variant</a:t>
+                      </a:r>
+                      <a:endParaRPr lang="en-US" sz="2000" b="1" i="0" u="none" strike="noStrike" dirty="0">
                         <a:solidFill>
                           <a:srgbClr val="000000"/>
                         </a:solidFill>
@@ -4490,18 +4559,12 @@
                     <a:p>
                       <a:pPr algn="r" fontAlgn="b"/>
                       <a:r>
-                        <a:rPr lang="en-US" sz="1800" b="1" u="none" strike="noStrike" dirty="0">
-                          <a:effectLst/>
-                        </a:rPr>
-                        <a:t>Startup (</a:t>
-                      </a:r>
-                      <a:r>
-                        <a:rPr lang="en-US" sz="1800" b="1" u="none" strike="noStrike" dirty="0" smtClean="0">
-                          <a:effectLst/>
-                        </a:rPr>
-                        <a:t>s)</a:t>
-                      </a:r>
-                      <a:endParaRPr lang="en-US" sz="1800" b="1" i="0" u="none" strike="noStrike" dirty="0">
+                        <a:rPr lang="en-US" sz="2000" b="1" u="none" strike="noStrike" dirty="0">
+                          <a:effectLst/>
+                        </a:rPr>
+                        <a:t>Startup (s)</a:t>
+                      </a:r>
+                      <a:endParaRPr lang="en-US" sz="2000" b="1" i="0" u="none" strike="noStrike" dirty="0">
                         <a:solidFill>
                           <a:srgbClr val="000000"/>
                         </a:solidFill>
@@ -4521,12 +4584,102 @@
                     <a:p>
                       <a:pPr algn="r" fontAlgn="b"/>
                       <a:r>
-                        <a:rPr lang="en-US" sz="1800" b="1" u="none" strike="noStrike" dirty="0">
-                          <a:effectLst/>
-                        </a:rPr>
-                        <a:t>Disk Size (MB)</a:t>
-                      </a:r>
-                      <a:endParaRPr lang="en-US" sz="1800" b="1" i="0" u="none" strike="noStrike" dirty="0">
+                        <a:rPr lang="en-US" sz="2000" b="1" u="none" strike="noStrike" dirty="0">
+                          <a:effectLst/>
+                        </a:rPr>
+                        <a:t>Mem (MB)</a:t>
+                      </a:r>
+                      <a:endParaRPr lang="en-US" sz="2000" b="1" i="0" u="none" strike="noStrike" dirty="0">
+                        <a:solidFill>
+                          <a:srgbClr val="000000"/>
+                        </a:solidFill>
+                        <a:effectLst/>
+                        <a:latin typeface="Calibri" charset="0"/>
+                      </a:endParaRPr>
+                    </a:p>
+                  </a:txBody>
+                  <a:tcPr marL="12700" marR="12700" marT="12700" marB="0" anchor="b">
+                    <a:noFill/>
+                  </a:tcPr>
+                </a:tc>
+                <a:tc>
+                  <a:txBody>
+                    <a:bodyPr/>
+                    <a:lstStyle/>
+                    <a:p>
+                      <a:pPr algn="r" fontAlgn="b"/>
+                      <a:r>
+                        <a:rPr lang="en-US" sz="2000" b="1" u="none" strike="noStrike">
+                          <a:effectLst/>
+                        </a:rPr>
+                        <a:t>Disk (MB)</a:t>
+                      </a:r>
+                      <a:endParaRPr lang="en-US" sz="2000" b="1" i="0" u="none" strike="noStrike">
+                        <a:solidFill>
+                          <a:srgbClr val="000000"/>
+                        </a:solidFill>
+                        <a:effectLst/>
+                        <a:latin typeface="Calibri" charset="0"/>
+                      </a:endParaRPr>
+                    </a:p>
+                  </a:txBody>
+                  <a:tcPr marL="12700" marR="12700" marT="12700" marB="0" anchor="b">
+                    <a:noFill/>
+                  </a:tcPr>
+                </a:tc>
+                <a:tc>
+                  <a:txBody>
+                    <a:bodyPr/>
+                    <a:lstStyle/>
+                    <a:p>
+                      <a:pPr algn="r" fontAlgn="b"/>
+                      <a:endParaRPr lang="en-US" sz="2000" b="1" i="0" u="none" strike="noStrike">
+                        <a:solidFill>
+                          <a:srgbClr val="000000"/>
+                        </a:solidFill>
+                        <a:effectLst/>
+                        <a:latin typeface="Calibri" charset="0"/>
+                      </a:endParaRPr>
+                    </a:p>
+                  </a:txBody>
+                  <a:tcPr marL="12700" marR="12700" marT="12700" marB="0" anchor="b">
+                    <a:noFill/>
+                  </a:tcPr>
+                </a:tc>
+                <a:tc>
+                  <a:txBody>
+                    <a:bodyPr/>
+                    <a:lstStyle/>
+                    <a:p>
+                      <a:pPr algn="l" fontAlgn="b"/>
+                      <a:r>
+                        <a:rPr lang="en-US" sz="2000" b="1" u="none" strike="noStrike" dirty="0">
+                          <a:effectLst/>
+                        </a:rPr>
+                        <a:t>Disk Size Composition</a:t>
+                      </a:r>
+                      <a:endParaRPr lang="en-US" sz="2000" b="1" i="0" u="none" strike="noStrike" dirty="0">
+                        <a:solidFill>
+                          <a:srgbClr val="000000"/>
+                        </a:solidFill>
+                        <a:effectLst/>
+                        <a:latin typeface="Calibri" charset="0"/>
+                      </a:endParaRPr>
+                    </a:p>
+                  </a:txBody>
+                  <a:tcPr marL="12700" marR="12700" marT="12700" marB="0" anchor="b">
+                    <a:noFill/>
+                  </a:tcPr>
+                </a:tc>
+              </a:tr>
+              <a:tr h="311150">
+                <a:tc>
+                  <a:txBody>
+                    <a:bodyPr/>
+                    <a:lstStyle/>
+                    <a:p>
+                      <a:pPr algn="l" fontAlgn="b"/>
+                      <a:endParaRPr lang="en-US" sz="1200" b="1" i="0" u="none" strike="noStrike" dirty="0">
                         <a:solidFill>
                           <a:srgbClr val="000000"/>
                         </a:solidFill>
@@ -4563,14 +4716,65 @@
                     <a:bodyPr/>
                     <a:lstStyle/>
                     <a:p>
+                      <a:pPr algn="r" fontAlgn="b"/>
+                      <a:endParaRPr lang="en-US" sz="1800" b="1" i="0" u="none" strike="noStrike">
+                        <a:solidFill>
+                          <a:srgbClr val="000000"/>
+                        </a:solidFill>
+                        <a:effectLst/>
+                        <a:latin typeface="Calibri" charset="0"/>
+                      </a:endParaRPr>
+                    </a:p>
+                  </a:txBody>
+                  <a:tcPr marL="12700" marR="12700" marT="12700" marB="0" anchor="b">
+                    <a:noFill/>
+                  </a:tcPr>
+                </a:tc>
+                <a:tc>
+                  <a:txBody>
+                    <a:bodyPr/>
+                    <a:lstStyle/>
+                    <a:p>
+                      <a:pPr algn="r" fontAlgn="b"/>
+                      <a:endParaRPr lang="en-US" sz="1800" b="1" i="0" u="none" strike="noStrike">
+                        <a:solidFill>
+                          <a:srgbClr val="000000"/>
+                        </a:solidFill>
+                        <a:effectLst/>
+                        <a:latin typeface="Calibri" charset="0"/>
+                      </a:endParaRPr>
+                    </a:p>
+                  </a:txBody>
+                  <a:tcPr marL="12700" marR="12700" marT="12700" marB="0" anchor="b">
+                    <a:noFill/>
+                  </a:tcPr>
+                </a:tc>
+                <a:tc>
+                  <a:txBody>
+                    <a:bodyPr/>
+                    <a:lstStyle/>
+                    <a:p>
+                      <a:pPr algn="r" fontAlgn="b"/>
+                      <a:endParaRPr lang="en-US" sz="1800" b="1" i="0" u="none" strike="noStrike">
+                        <a:solidFill>
+                          <a:srgbClr val="000000"/>
+                        </a:solidFill>
+                        <a:effectLst/>
+                        <a:latin typeface="Calibri" charset="0"/>
+                      </a:endParaRPr>
+                    </a:p>
+                  </a:txBody>
+                  <a:tcPr marL="12700" marR="12700" marT="12700" marB="0" anchor="b">
+                    <a:noFill/>
+                  </a:tcPr>
+                </a:tc>
+                <a:tc>
+                  <a:txBody>
+                    <a:bodyPr/>
+                    <a:lstStyle/>
+                    <a:p>
                       <a:pPr algn="l" fontAlgn="b"/>
-                      <a:r>
-                        <a:rPr lang="en-US" sz="1800" b="1" u="none" strike="noStrike" dirty="0">
-                          <a:effectLst/>
-                        </a:rPr>
-                        <a:t>Disk Size Composition</a:t>
-                      </a:r>
-                      <a:endParaRPr lang="en-US" sz="1800" b="1" i="0" u="none" strike="noStrike" dirty="0">
+                      <a:endParaRPr lang="en-US" sz="1800" b="1" i="0" u="none" strike="noStrike">
                         <a:solidFill>
                           <a:srgbClr val="000000"/>
                         </a:solidFill>
@@ -4584,30 +4788,18 @@
                   </a:tcPr>
                 </a:tc>
               </a:tr>
-              <a:tr h="310129">
+              <a:tr h="311150">
                 <a:tc>
                   <a:txBody>
                     <a:bodyPr/>
                     <a:lstStyle/>
                     <a:p>
                       <a:pPr algn="l" fontAlgn="b"/>
-                      <a:endParaRPr lang="en-US" sz="1800" u="none" strike="noStrike" dirty="0" smtClean="0">
-                        <a:effectLst/>
-                      </a:endParaRPr>
-                    </a:p>
-                    <a:p>
-                      <a:pPr algn="l" fontAlgn="b"/>
-                      <a:r>
-                        <a:rPr lang="en-US" sz="1800" u="none" strike="noStrike" dirty="0" err="1" smtClean="0">
-                          <a:effectLst/>
-                        </a:rPr>
-                        <a:t>helidon</a:t>
-                      </a:r>
-                      <a:r>
-                        <a:rPr lang="en-US" sz="1800" u="none" strike="noStrike" dirty="0" smtClean="0">
-                          <a:effectLst/>
-                        </a:rPr>
-                        <a:t>-se </a:t>
+                      <a:r>
+                        <a:rPr lang="en-US" sz="1800" u="none" strike="noStrike" dirty="0">
+                          <a:effectLst/>
+                        </a:rPr>
+                        <a:t>helidon-se </a:t>
                       </a:r>
                       <a:endParaRPr lang="en-US" sz="1800" b="0" i="0" u="none" strike="noStrike" dirty="0">
                         <a:solidFill>
@@ -4635,6 +4827,31 @@
                         <a:t>1.005</a:t>
                       </a:r>
                       <a:endParaRPr lang="is-IS" sz="1800" b="0" i="0" u="none" strike="noStrike">
+                        <a:solidFill>
+                          <a:srgbClr val="000000"/>
+                        </a:solidFill>
+                        <a:effectLst/>
+                        <a:latin typeface="Calibri" charset="0"/>
+                      </a:endParaRPr>
+                    </a:p>
+                  </a:txBody>
+                  <a:tcPr marL="12700" marR="12700" marT="12700" marB="0" anchor="b">
+                    <a:noFill/>
+                  </a:tcPr>
+                </a:tc>
+                <a:tc>
+                  <a:txBody>
+                    <a:bodyPr/>
+                    <a:lstStyle/>
+                    <a:p>
+                      <a:pPr algn="r" fontAlgn="b"/>
+                      <a:r>
+                        <a:rPr lang="fi-FI" sz="1800" u="none" strike="noStrike">
+                          <a:effectLst/>
+                        </a:rPr>
+                        <a:t>87.8</a:t>
+                      </a:r>
+                      <a:endParaRPr lang="fi-FI" sz="1800" b="0" i="0" u="none" strike="noStrike">
                         <a:solidFill>
                           <a:srgbClr val="000000"/>
                         </a:solidFill>
@@ -4698,42 +4915,12 @@
                     <a:p>
                       <a:pPr algn="l" fontAlgn="b"/>
                       <a:r>
-                        <a:rPr lang="cs-CZ" sz="1800" u="none" strike="noStrike" dirty="0">
-                          <a:effectLst/>
-                        </a:rPr>
-                        <a:t>279 </a:t>
-                      </a:r>
-                      <a:r>
-                        <a:rPr lang="cs-CZ" sz="1800" u="none" strike="noStrike" dirty="0" err="1">
-                          <a:effectLst/>
-                        </a:rPr>
-                        <a:t>jdk</a:t>
-                      </a:r>
-                      <a:r>
-                        <a:rPr lang="cs-CZ" sz="1800" u="none" strike="noStrike" dirty="0">
-                          <a:effectLst/>
-                        </a:rPr>
-                        <a:t> -74 </a:t>
-                      </a:r>
-                      <a:r>
-                        <a:rPr lang="cs-CZ" sz="1800" u="none" strike="noStrike" dirty="0" err="1">
-                          <a:effectLst/>
-                        </a:rPr>
-                        <a:t>jmod</a:t>
-                      </a:r>
-                      <a:r>
-                        <a:rPr lang="cs-CZ" sz="1800" u="none" strike="noStrike" dirty="0">
-                          <a:effectLst/>
-                        </a:rPr>
-                        <a:t> + 8.6 </a:t>
-                      </a:r>
-                      <a:r>
-                        <a:rPr lang="cs-CZ" sz="1800" u="none" strike="noStrike" dirty="0" err="1" smtClean="0">
-                          <a:effectLst/>
-                        </a:rPr>
-                        <a:t>app</a:t>
-                      </a:r>
-                      <a:endParaRPr lang="cs-CZ" sz="1800" b="0" i="0" u="none" strike="noStrike" dirty="0">
+                        <a:rPr lang="cs-CZ" sz="1800" u="none" strike="noStrike">
+                          <a:effectLst/>
+                        </a:rPr>
+                        <a:t>279 jdk -74 jmod + 8.6 app</a:t>
+                      </a:r>
+                      <a:endParaRPr lang="cs-CZ" sz="1800" b="0" i="0" u="none" strike="noStrike">
                         <a:solidFill>
                           <a:srgbClr val="000000"/>
                         </a:solidFill>
@@ -4747,7 +4934,7 @@
                   </a:tcPr>
                 </a:tc>
               </a:tr>
-              <a:tr h="310129">
+              <a:tr h="311150">
                 <a:tc>
                   <a:txBody>
                     <a:bodyPr/>
@@ -4755,10 +4942,16 @@
                     <a:p>
                       <a:pPr algn="l" fontAlgn="b"/>
                       <a:r>
-                        <a:rPr lang="en-US" sz="1800" u="none" strike="noStrike" dirty="0" err="1" smtClean="0">
-                          <a:effectLst/>
-                        </a:rPr>
-                        <a:t>helidon-se+cds</a:t>
+                        <a:rPr lang="en-US" sz="1800" u="none" strike="noStrike" dirty="0">
+                          <a:effectLst/>
+                        </a:rPr>
+                        <a:t>helidon-se-</a:t>
+                      </a:r>
+                      <a:r>
+                        <a:rPr lang="en-US" sz="1800" u="none" strike="noStrike" dirty="0" err="1">
+                          <a:effectLst/>
+                        </a:rPr>
+                        <a:t>cds</a:t>
                       </a:r>
                       <a:endParaRPr lang="en-US" sz="1800" b="0" i="0" u="none" strike="noStrike" dirty="0">
                         <a:solidFill>
@@ -4780,12 +4973,12 @@
                     <a:p>
                       <a:pPr algn="r" fontAlgn="b"/>
                       <a:r>
-                        <a:rPr lang="nb-NO" sz="1800" u="none" strike="noStrike" dirty="0">
+                        <a:rPr lang="nb-NO" sz="1800" u="none" strike="noStrike">
                           <a:effectLst/>
                         </a:rPr>
                         <a:t>0.619</a:t>
                       </a:r>
-                      <a:endParaRPr lang="nb-NO" sz="1800" b="0" i="0" u="none" strike="noStrike" dirty="0">
+                      <a:endParaRPr lang="nb-NO" sz="1800" b="0" i="0" u="none" strike="noStrike">
                         <a:solidFill>
                           <a:srgbClr val="000000"/>
                         </a:solidFill>
@@ -4805,12 +4998,37 @@
                     <a:p>
                       <a:pPr algn="r" fontAlgn="b"/>
                       <a:r>
-                        <a:rPr lang="is-IS" sz="1800" u="none" strike="noStrike" dirty="0">
+                        <a:rPr lang="fi-FI" sz="1800" u="none" strike="noStrike">
+                          <a:effectLst/>
+                        </a:rPr>
+                        <a:t>87.1</a:t>
+                      </a:r>
+                      <a:endParaRPr lang="fi-FI" sz="1800" b="0" i="0" u="none" strike="noStrike">
+                        <a:solidFill>
+                          <a:srgbClr val="000000"/>
+                        </a:solidFill>
+                        <a:effectLst/>
+                        <a:latin typeface="Calibri" charset="0"/>
+                      </a:endParaRPr>
+                    </a:p>
+                  </a:txBody>
+                  <a:tcPr marL="12700" marR="12700" marT="12700" marB="0" anchor="b">
+                    <a:noFill/>
+                  </a:tcPr>
+                </a:tc>
+                <a:tc>
+                  <a:txBody>
+                    <a:bodyPr/>
+                    <a:lstStyle/>
+                    <a:p>
+                      <a:pPr algn="r" fontAlgn="b"/>
+                      <a:r>
+                        <a:rPr lang="is-IS" sz="1800" u="none" strike="noStrike">
                           <a:effectLst/>
                         </a:rPr>
                         <a:t>246.6</a:t>
                       </a:r>
-                      <a:endParaRPr lang="is-IS" sz="1800" b="0" i="0" u="none" strike="noStrike" dirty="0">
+                      <a:endParaRPr lang="is-IS" sz="1800" b="0" i="0" u="none" strike="noStrike">
                         <a:solidFill>
                           <a:srgbClr val="000000"/>
                         </a:solidFill>
@@ -4849,91 +5067,37 @@
                     <a:p>
                       <a:pPr algn="l" fontAlgn="b"/>
                       <a:r>
+                        <a:rPr lang="en-US" sz="1800" u="none" strike="noStrike">
+                          <a:effectLst/>
+                        </a:rPr>
+                        <a:t>279 jdk -74 jmod + 8.6 app + 33 cds</a:t>
+                      </a:r>
+                      <a:endParaRPr lang="en-US" sz="1800" b="0" i="0" u="none" strike="noStrike">
+                        <a:solidFill>
+                          <a:srgbClr val="000000"/>
+                        </a:solidFill>
+                        <a:effectLst/>
+                        <a:latin typeface="Calibri" charset="0"/>
+                      </a:endParaRPr>
+                    </a:p>
+                  </a:txBody>
+                  <a:tcPr marL="12700" marR="12700" marT="12700" marB="0" anchor="b">
+                    <a:noFill/>
+                  </a:tcPr>
+                </a:tc>
+              </a:tr>
+              <a:tr h="311150">
+                <a:tc>
+                  <a:txBody>
+                    <a:bodyPr/>
+                    <a:lstStyle/>
+                    <a:p>
+                      <a:pPr algn="l" fontAlgn="b"/>
+                      <a:r>
                         <a:rPr lang="en-US" sz="1800" u="none" strike="noStrike" dirty="0">
                           <a:effectLst/>
                         </a:rPr>
-                        <a:t>279 </a:t>
-                      </a:r>
-                      <a:r>
-                        <a:rPr lang="en-US" sz="1800" u="none" strike="noStrike" dirty="0" err="1">
-                          <a:effectLst/>
-                        </a:rPr>
-                        <a:t>jdk</a:t>
-                      </a:r>
-                      <a:r>
-                        <a:rPr lang="en-US" sz="1800" u="none" strike="noStrike" dirty="0">
-                          <a:effectLst/>
-                        </a:rPr>
-                        <a:t> -74 </a:t>
-                      </a:r>
-                      <a:r>
-                        <a:rPr lang="en-US" sz="1800" u="none" strike="noStrike" dirty="0" err="1">
-                          <a:effectLst/>
-                        </a:rPr>
-                        <a:t>jmod</a:t>
-                      </a:r>
-                      <a:r>
-                        <a:rPr lang="en-US" sz="1800" u="none" strike="noStrike" dirty="0">
-                          <a:effectLst/>
-                        </a:rPr>
-                        <a:t> + 8.6 </a:t>
-                      </a:r>
-                      <a:r>
-                        <a:rPr lang="en-US" sz="1800" u="none" strike="noStrike" dirty="0" smtClean="0">
-                          <a:effectLst/>
-                        </a:rPr>
-                        <a:t>app + </a:t>
-                      </a:r>
-                      <a:r>
-                        <a:rPr lang="en-US" sz="1800" u="none" strike="noStrike" dirty="0">
-                          <a:effectLst/>
-                        </a:rPr>
-                        <a:t>33 </a:t>
-                      </a:r>
-                      <a:r>
-                        <a:rPr lang="en-US" sz="1800" u="none" strike="noStrike" dirty="0" err="1" smtClean="0">
-                          <a:effectLst/>
-                        </a:rPr>
-                        <a:t>cds</a:t>
-                      </a:r>
-                      <a:endParaRPr lang="en-US" sz="1800" b="0" i="0" u="none" strike="noStrike" dirty="0">
-                        <a:solidFill>
-                          <a:srgbClr val="000000"/>
-                        </a:solidFill>
-                        <a:effectLst/>
-                        <a:latin typeface="Calibri" charset="0"/>
-                      </a:endParaRPr>
-                    </a:p>
-                  </a:txBody>
-                  <a:tcPr marL="12700" marR="12700" marT="12700" marB="0" anchor="b">
-                    <a:noFill/>
-                  </a:tcPr>
-                </a:tc>
-              </a:tr>
-              <a:tr h="310129">
-                <a:tc>
-                  <a:txBody>
-                    <a:bodyPr/>
-                    <a:lstStyle/>
-                    <a:p>
-                      <a:pPr algn="l" fontAlgn="b"/>
-                      <a:r>
-                        <a:rPr lang="en-US" sz="1800" b="0" u="none" strike="noStrike" dirty="0" err="1">
-                          <a:solidFill>
-                            <a:schemeClr val="tx1"/>
-                          </a:solidFill>
-                          <a:effectLst/>
-                        </a:rPr>
-                        <a:t>helidon</a:t>
-                      </a:r>
-                      <a:r>
-                        <a:rPr lang="en-US" sz="1800" b="0" u="none" strike="noStrike" dirty="0">
-                          <a:solidFill>
-                            <a:schemeClr val="tx1"/>
-                          </a:solidFill>
-                          <a:effectLst/>
-                        </a:rPr>
-                        <a:t>-se-</a:t>
+                        <a:t>helidon-se-</a:t>
                       </a:r>
                       <a:r>
                         <a:rPr lang="en-US" sz="1800" b="1" u="none" strike="noStrike" dirty="0">
@@ -5019,7 +5183,7 @@
                           </a:solidFill>
                           <a:effectLst/>
                         </a:rPr>
-                        <a:t>53.0</a:t>
+                        <a:t>93.0</a:t>
                       </a:r>
                       <a:endParaRPr lang="hr-HR" sz="1800" b="1" i="0" u="none" strike="noStrike" dirty="0">
                         <a:solidFill>
@@ -5041,82 +5205,9 @@
                     <a:bodyPr/>
                     <a:lstStyle/>
                     <a:p>
-                      <a:pPr algn="l" fontAlgn="b"/>
-                      <a:endParaRPr lang="en-US" sz="1800" b="1" i="0" u="none" strike="noStrike" dirty="0">
-                        <a:solidFill>
-                          <a:srgbClr val="548235"/>
-                        </a:solidFill>
-                        <a:effectLst/>
-                        <a:latin typeface="Calibri" charset="0"/>
-                      </a:endParaRPr>
-                    </a:p>
-                  </a:txBody>
-                  <a:tcPr marL="12700" marR="12700" marT="12700" marB="0" anchor="b">
-                    <a:noFill/>
-                  </a:tcPr>
-                </a:tc>
-                <a:tc>
-                  <a:txBody>
-                    <a:bodyPr/>
-                    <a:lstStyle/>
-                    <a:p>
-                      <a:pPr algn="l" fontAlgn="b"/>
-                      <a:r>
-                        <a:rPr lang="da-DK" sz="1800" u="none" strike="noStrike" dirty="0">
-                          <a:effectLst/>
-                        </a:rPr>
-                        <a:t>85 </a:t>
-                      </a:r>
-                      <a:r>
-                        <a:rPr lang="da-DK" sz="1800" u="none" strike="noStrike" dirty="0" err="1">
-                          <a:effectLst/>
-                        </a:rPr>
-                        <a:t>jre</a:t>
-                      </a:r>
-                      <a:r>
-                        <a:rPr lang="da-DK" sz="1800" u="none" strike="noStrike" dirty="0">
-                          <a:effectLst/>
-                        </a:rPr>
-                        <a:t> - 32 </a:t>
-                      </a:r>
-                      <a:r>
-                        <a:rPr lang="da-DK" sz="1800" u="none" strike="noStrike" dirty="0" err="1">
-                          <a:effectLst/>
-                        </a:rPr>
-                        <a:t>cds</a:t>
-                      </a:r>
-                      <a:endParaRPr lang="da-DK" sz="1800" b="1" i="0" u="none" strike="noStrike" dirty="0">
-                        <a:solidFill>
-                          <a:srgbClr val="548235"/>
-                        </a:solidFill>
-                        <a:effectLst/>
-                        <a:latin typeface="Calibri" charset="0"/>
-                      </a:endParaRPr>
-                    </a:p>
-                  </a:txBody>
-                  <a:tcPr marL="12700" marR="12700" marT="12700" marB="0" anchor="b">
-                    <a:noFill/>
-                  </a:tcPr>
-                </a:tc>
-              </a:tr>
-              <a:tr h="310129">
-                <a:tc>
-                  <a:txBody>
-                    <a:bodyPr/>
-                    <a:lstStyle/>
-                    <a:p>
-                      <a:pPr algn="l" fontAlgn="b"/>
-                      <a:r>
-                        <a:rPr lang="en-US" sz="1800" b="0" u="none" strike="noStrike" dirty="0" err="1" smtClean="0">
-                          <a:solidFill>
-                            <a:schemeClr val="tx1"/>
-                          </a:solidFill>
-                          <a:effectLst/>
-                        </a:rPr>
-                        <a:t>helidon-se-</a:t>
-                      </a:r>
-                      <a:r>
-                        <a:rPr lang="en-US" sz="1800" b="1" u="none" strike="noStrike" dirty="0" err="1" smtClean="0">
+                      <a:pPr algn="r" fontAlgn="b"/>
+                      <a:r>
+                        <a:rPr lang="hr-HR" sz="1800" b="1" u="none" strike="noStrike" dirty="0">
                           <a:solidFill>
                             <a:schemeClr val="accent6">
                               <a:lumMod val="75000"/>
@@ -5124,9 +5215,190 @@
                           </a:solidFill>
                           <a:effectLst/>
                         </a:rPr>
-                        <a:t>jars-jre+cds</a:t>
+                        <a:t>53.0</a:t>
+                      </a:r>
+                      <a:endParaRPr lang="hr-HR" sz="1800" b="1" i="0" u="none" strike="noStrike" dirty="0">
+                        <a:solidFill>
+                          <a:schemeClr val="accent6">
+                            <a:lumMod val="75000"/>
+                          </a:schemeClr>
+                        </a:solidFill>
+                        <a:effectLst/>
+                        <a:latin typeface="Calibri" charset="0"/>
+                      </a:endParaRPr>
+                    </a:p>
+                  </a:txBody>
+                  <a:tcPr marL="12700" marR="12700" marT="12700" marB="0" anchor="b">
+                    <a:noFill/>
+                  </a:tcPr>
+                </a:tc>
+                <a:tc>
+                  <a:txBody>
+                    <a:bodyPr/>
+                    <a:lstStyle/>
+                    <a:p>
+                      <a:pPr algn="l" fontAlgn="b"/>
+                      <a:endParaRPr lang="en-US" sz="1800" b="1" i="0" u="none" strike="noStrike">
+                        <a:solidFill>
+                          <a:srgbClr val="548235"/>
+                        </a:solidFill>
+                        <a:effectLst/>
+                        <a:latin typeface="Calibri" charset="0"/>
+                      </a:endParaRPr>
+                    </a:p>
+                  </a:txBody>
+                  <a:tcPr marL="12700" marR="12700" marT="12700" marB="0" anchor="b">
+                    <a:noFill/>
+                  </a:tcPr>
+                </a:tc>
+                <a:tc>
+                  <a:txBody>
+                    <a:bodyPr/>
+                    <a:lstStyle/>
+                    <a:p>
+                      <a:pPr algn="l" fontAlgn="b"/>
+                      <a:r>
+                        <a:rPr lang="da-DK" sz="1800" u="none" strike="noStrike">
+                          <a:effectLst/>
+                        </a:rPr>
+                        <a:t>85 jre - 32 cds</a:t>
+                      </a:r>
+                      <a:endParaRPr lang="da-DK" sz="1800" b="1" i="0" u="none" strike="noStrike">
+                        <a:solidFill>
+                          <a:srgbClr val="548235"/>
+                        </a:solidFill>
+                        <a:effectLst/>
+                        <a:latin typeface="Calibri" charset="0"/>
+                      </a:endParaRPr>
+                    </a:p>
+                  </a:txBody>
+                  <a:tcPr marL="12700" marR="12700" marT="12700" marB="0" anchor="b">
+                    <a:noFill/>
+                  </a:tcPr>
+                </a:tc>
+              </a:tr>
+              <a:tr h="311150">
+                <a:tc>
+                  <a:txBody>
+                    <a:bodyPr/>
+                    <a:lstStyle/>
+                    <a:p>
+                      <a:pPr algn="l" fontAlgn="b"/>
+                      <a:r>
+                        <a:rPr lang="en-US" sz="1800" u="none" strike="noStrike" dirty="0">
+                          <a:effectLst/>
+                        </a:rPr>
+                        <a:t>helidon-se-</a:t>
+                      </a:r>
+                      <a:r>
+                        <a:rPr lang="en-US" sz="1800" b="1" u="none" strike="noStrike" dirty="0">
+                          <a:solidFill>
+                            <a:schemeClr val="accent6">
+                              <a:lumMod val="75000"/>
+                            </a:schemeClr>
+                          </a:solidFill>
+                          <a:effectLst/>
+                        </a:rPr>
+                        <a:t>jars-</a:t>
+                      </a:r>
+                      <a:r>
+                        <a:rPr lang="en-US" sz="1800" b="1" u="none" strike="noStrike" dirty="0" err="1">
+                          <a:solidFill>
+                            <a:schemeClr val="accent6">
+                              <a:lumMod val="75000"/>
+                            </a:schemeClr>
+                          </a:solidFill>
+                          <a:effectLst/>
+                        </a:rPr>
+                        <a:t>jre</a:t>
+                      </a:r>
+                      <a:r>
+                        <a:rPr lang="en-US" sz="1800" b="1" u="none" strike="noStrike" dirty="0">
+                          <a:solidFill>
+                            <a:schemeClr val="accent6">
+                              <a:lumMod val="75000"/>
+                            </a:schemeClr>
+                          </a:solidFill>
+                          <a:effectLst/>
+                        </a:rPr>
+                        <a:t>-</a:t>
+                      </a:r>
+                      <a:r>
+                        <a:rPr lang="en-US" sz="1800" b="1" u="none" strike="noStrike" dirty="0" err="1">
+                          <a:solidFill>
+                            <a:schemeClr val="accent6">
+                              <a:lumMod val="75000"/>
+                            </a:schemeClr>
+                          </a:solidFill>
+                          <a:effectLst/>
+                        </a:rPr>
+                        <a:t>cds</a:t>
                       </a:r>
                       <a:endParaRPr lang="en-US" sz="1800" b="1" i="0" u="none" strike="noStrike" dirty="0">
+                        <a:solidFill>
+                          <a:schemeClr val="accent6">
+                            <a:lumMod val="75000"/>
+                          </a:schemeClr>
+                        </a:solidFill>
+                        <a:effectLst/>
+                        <a:latin typeface="Calibri" charset="0"/>
+                      </a:endParaRPr>
+                    </a:p>
+                  </a:txBody>
+                  <a:tcPr marL="12700" marR="12700" marT="12700" marB="0" anchor="b">
+                    <a:noFill/>
+                  </a:tcPr>
+                </a:tc>
+                <a:tc>
+                  <a:txBody>
+                    <a:bodyPr/>
+                    <a:lstStyle/>
+                    <a:p>
+                      <a:pPr algn="r" fontAlgn="b"/>
+                      <a:r>
+                        <a:rPr lang="nb-NO" sz="1800" b="1" u="none" strike="noStrike">
+                          <a:solidFill>
+                            <a:schemeClr val="accent6">
+                              <a:lumMod val="75000"/>
+                            </a:schemeClr>
+                          </a:solidFill>
+                          <a:effectLst/>
+                        </a:rPr>
+                        <a:t>0.572</a:t>
+                      </a:r>
+                      <a:endParaRPr lang="nb-NO" sz="1800" b="1" i="0" u="none" strike="noStrike">
+                        <a:solidFill>
+                          <a:schemeClr val="accent6">
+                            <a:lumMod val="75000"/>
+                          </a:schemeClr>
+                        </a:solidFill>
+                        <a:effectLst/>
+                        <a:latin typeface="Calibri" charset="0"/>
+                      </a:endParaRPr>
+                    </a:p>
+                  </a:txBody>
+                  <a:tcPr marL="12700" marR="12700" marT="12700" marB="0" anchor="b">
+                    <a:noFill/>
+                  </a:tcPr>
+                </a:tc>
+                <a:tc>
+                  <a:txBody>
+                    <a:bodyPr/>
+                    <a:lstStyle/>
+                    <a:p>
+                      <a:pPr algn="r" fontAlgn="b"/>
+                      <a:r>
+                        <a:rPr lang="hr-HR" sz="1800" b="1" u="none" strike="noStrike" dirty="0">
+                          <a:solidFill>
+                            <a:schemeClr val="accent6">
+                              <a:lumMod val="75000"/>
+                            </a:schemeClr>
+                          </a:solidFill>
+                          <a:effectLst/>
+                        </a:rPr>
+                        <a:t>84.8</a:t>
+                      </a:r>
+                      <a:endParaRPr lang="hr-HR" sz="1800" b="1" i="0" u="none" strike="noStrike" dirty="0">
                         <a:solidFill>
                           <a:schemeClr val="accent6">
                             <a:lumMod val="75000"/>
@@ -5156,7 +5428,7 @@
                           </a:solidFill>
                           <a:effectLst/>
                         </a:rPr>
-                        <a:t>0.572</a:t>
+                        <a:t>85.0</a:t>
                       </a:r>
                       <a:endParaRPr lang="nb-NO" sz="1800" b="1" i="0" u="none" strike="noStrike" dirty="0">
                         <a:solidFill>
@@ -5178,38 +5450,6 @@
                     <a:bodyPr/>
                     <a:lstStyle/>
                     <a:p>
-                      <a:pPr algn="r" fontAlgn="b"/>
-                      <a:r>
-                        <a:rPr lang="nb-NO" sz="1800" b="1" u="none" strike="noStrike" dirty="0">
-                          <a:solidFill>
-                            <a:schemeClr val="accent6">
-                              <a:lumMod val="75000"/>
-                            </a:schemeClr>
-                          </a:solidFill>
-                          <a:effectLst/>
-                        </a:rPr>
-                        <a:t>85.0</a:t>
-                      </a:r>
-                      <a:endParaRPr lang="nb-NO" sz="1800" b="1" i="0" u="none" strike="noStrike" dirty="0">
-                        <a:solidFill>
-                          <a:schemeClr val="accent6">
-                            <a:lumMod val="75000"/>
-                          </a:schemeClr>
-                        </a:solidFill>
-                        <a:effectLst/>
-                        <a:latin typeface="Calibri" charset="0"/>
-                      </a:endParaRPr>
-                    </a:p>
-                  </a:txBody>
-                  <a:tcPr marL="12700" marR="12700" marT="12700" marB="0" anchor="b">
-                    <a:noFill/>
-                  </a:tcPr>
-                </a:tc>
-                <a:tc>
-                  <a:txBody>
-                    <a:bodyPr/>
-                    <a:lstStyle/>
-                    <a:p>
                       <a:pPr algn="l" fontAlgn="b"/>
                       <a:endParaRPr lang="en-US" sz="1800" b="1" i="0" u="none" strike="noStrike">
                         <a:solidFill>
@@ -5256,7 +5496,7 @@
                   </a:tcPr>
                 </a:tc>
               </a:tr>
-              <a:tr h="310129">
+              <a:tr h="311150">
                 <a:tc>
                   <a:txBody>
                     <a:bodyPr/>
@@ -5295,10 +5535,199 @@
                     <a:p>
                       <a:pPr algn="r" fontAlgn="b"/>
                       <a:r>
+                        <a:rPr lang="hr-HR" sz="1800" u="none" strike="noStrike" dirty="0">
+                          <a:effectLst/>
+                        </a:rPr>
+                        <a:t>0.924</a:t>
+                      </a:r>
+                      <a:endParaRPr lang="hr-HR" sz="1800" b="0" i="0" u="none" strike="noStrike" dirty="0">
+                        <a:solidFill>
+                          <a:srgbClr val="000000"/>
+                        </a:solidFill>
+                        <a:effectLst/>
+                        <a:latin typeface="Calibri" charset="0"/>
+                      </a:endParaRPr>
+                    </a:p>
+                  </a:txBody>
+                  <a:tcPr marL="12700" marR="12700" marT="12700" marB="0" anchor="b">
+                    <a:noFill/>
+                  </a:tcPr>
+                </a:tc>
+                <a:tc>
+                  <a:txBody>
+                    <a:bodyPr/>
+                    <a:lstStyle/>
+                    <a:p>
+                      <a:pPr algn="r" fontAlgn="b"/>
+                      <a:r>
+                        <a:rPr lang="hr-HR" sz="1800" u="none" strike="noStrike" dirty="0">
+                          <a:effectLst/>
+                        </a:rPr>
+                        <a:t>88.5</a:t>
+                      </a:r>
+                      <a:endParaRPr lang="hr-HR" sz="1800" b="0" i="0" u="none" strike="noStrike" dirty="0">
+                        <a:solidFill>
+                          <a:srgbClr val="000000"/>
+                        </a:solidFill>
+                        <a:effectLst/>
+                        <a:latin typeface="Calibri" charset="0"/>
+                      </a:endParaRPr>
+                    </a:p>
+                  </a:txBody>
+                  <a:tcPr marL="12700" marR="12700" marT="12700" marB="0" anchor="b">
+                    <a:noFill/>
+                  </a:tcPr>
+                </a:tc>
+                <a:tc>
+                  <a:txBody>
+                    <a:bodyPr/>
+                    <a:lstStyle/>
+                    <a:p>
+                      <a:pPr algn="r" fontAlgn="b"/>
+                      <a:r>
+                        <a:rPr lang="hr-HR" sz="1800" u="none" strike="noStrike" dirty="0">
+                          <a:effectLst/>
+                        </a:rPr>
+                        <a:t>53.0</a:t>
+                      </a:r>
+                      <a:endParaRPr lang="hr-HR" sz="1800" b="0" i="0" u="none" strike="noStrike" dirty="0">
+                        <a:solidFill>
+                          <a:srgbClr val="000000"/>
+                        </a:solidFill>
+                        <a:effectLst/>
+                        <a:latin typeface="Calibri" charset="0"/>
+                      </a:endParaRPr>
+                    </a:p>
+                  </a:txBody>
+                  <a:tcPr marL="12700" marR="12700" marT="12700" marB="0" anchor="b">
+                    <a:noFill/>
+                  </a:tcPr>
+                </a:tc>
+                <a:tc>
+                  <a:txBody>
+                    <a:bodyPr/>
+                    <a:lstStyle/>
+                    <a:p>
+                      <a:pPr algn="l" fontAlgn="b"/>
+                      <a:endParaRPr lang="en-US" sz="1800" b="0" i="0" u="none" strike="noStrike" dirty="0">
+                        <a:solidFill>
+                          <a:srgbClr val="000000"/>
+                        </a:solidFill>
+                        <a:effectLst/>
+                        <a:latin typeface="Calibri" charset="0"/>
+                      </a:endParaRPr>
+                    </a:p>
+                  </a:txBody>
+                  <a:tcPr marL="12700" marR="12700" marT="12700" marB="0" anchor="b">
+                    <a:noFill/>
+                  </a:tcPr>
+                </a:tc>
+                <a:tc>
+                  <a:txBody>
+                    <a:bodyPr/>
+                    <a:lstStyle/>
+                    <a:p>
+                      <a:pPr algn="l" fontAlgn="b"/>
+                      <a:r>
+                        <a:rPr lang="da-DK" sz="1800" u="none" strike="noStrike" dirty="0">
+                          <a:effectLst/>
+                        </a:rPr>
+                        <a:t>85 </a:t>
+                      </a:r>
+                      <a:r>
+                        <a:rPr lang="da-DK" sz="1800" u="none" strike="noStrike" dirty="0" err="1">
+                          <a:effectLst/>
+                        </a:rPr>
+                        <a:t>jre</a:t>
+                      </a:r>
+                      <a:r>
+                        <a:rPr lang="da-DK" sz="1800" u="none" strike="noStrike" dirty="0">
+                          <a:effectLst/>
+                        </a:rPr>
+                        <a:t> - 32 </a:t>
+                      </a:r>
+                      <a:r>
+                        <a:rPr lang="da-DK" sz="1800" u="none" strike="noStrike" dirty="0" err="1">
+                          <a:effectLst/>
+                        </a:rPr>
+                        <a:t>cds</a:t>
+                      </a:r>
+                      <a:endParaRPr lang="da-DK" sz="1800" b="0" i="0" u="none" strike="noStrike" dirty="0">
+                        <a:solidFill>
+                          <a:srgbClr val="000000"/>
+                        </a:solidFill>
+                        <a:effectLst/>
+                        <a:latin typeface="Calibri" charset="0"/>
+                      </a:endParaRPr>
+                    </a:p>
+                  </a:txBody>
+                  <a:tcPr marL="12700" marR="12700" marT="12700" marB="0" anchor="b">
+                    <a:noFill/>
+                  </a:tcPr>
+                </a:tc>
+              </a:tr>
+              <a:tr h="311150">
+                <a:tc>
+                  <a:txBody>
+                    <a:bodyPr/>
+                    <a:lstStyle/>
+                    <a:p>
+                      <a:pPr algn="l" fontAlgn="b"/>
+                      <a:r>
+                        <a:rPr lang="en-US" sz="1800" u="none" strike="noStrike">
+                          <a:effectLst/>
+                        </a:rPr>
+                        <a:t>helidon-se-modules-jre-cds</a:t>
+                      </a:r>
+                      <a:endParaRPr lang="en-US" sz="1800" b="0" i="0" u="none" strike="noStrike">
+                        <a:solidFill>
+                          <a:srgbClr val="000000"/>
+                        </a:solidFill>
+                        <a:effectLst/>
+                        <a:latin typeface="Calibri" charset="0"/>
+                      </a:endParaRPr>
+                    </a:p>
+                  </a:txBody>
+                  <a:tcPr marL="12700" marR="12700" marT="12700" marB="0" anchor="b">
+                    <a:noFill/>
+                  </a:tcPr>
+                </a:tc>
+                <a:tc>
+                  <a:txBody>
+                    <a:bodyPr/>
+                    <a:lstStyle/>
+                    <a:p>
+                      <a:pPr algn="r" fontAlgn="b"/>
+                      <a:r>
+                        <a:rPr lang="nb-NO" sz="1800" u="none" strike="noStrike">
+                          <a:effectLst/>
+                        </a:rPr>
+                        <a:t>0.519</a:t>
+                      </a:r>
+                      <a:endParaRPr lang="nb-NO" sz="1800" b="0" i="0" u="none" strike="noStrike">
+                        <a:solidFill>
+                          <a:srgbClr val="000000"/>
+                        </a:solidFill>
+                        <a:effectLst/>
+                        <a:latin typeface="Calibri" charset="0"/>
+                      </a:endParaRPr>
+                    </a:p>
+                  </a:txBody>
+                  <a:tcPr marL="12700" marR="12700" marT="12700" marB="0" anchor="b">
+                    <a:noFill/>
+                  </a:tcPr>
+                </a:tc>
+                <a:tc>
+                  <a:txBody>
+                    <a:bodyPr/>
+                    <a:lstStyle/>
+                    <a:p>
+                      <a:pPr algn="r" fontAlgn="b"/>
+                      <a:r>
                         <a:rPr lang="hr-HR" sz="1800" u="none" strike="noStrike">
                           <a:effectLst/>
                         </a:rPr>
-                        <a:t>0.924</a:t>
+                        <a:t>82.0</a:t>
                       </a:r>
                       <a:endParaRPr lang="hr-HR" sz="1800" b="0" i="0" u="none" strike="noStrike">
                         <a:solidFill>
@@ -5320,12 +5749,12 @@
                     <a:p>
                       <a:pPr algn="r" fontAlgn="b"/>
                       <a:r>
-                        <a:rPr lang="hr-HR" sz="1800" u="none" strike="noStrike">
-                          <a:effectLst/>
-                        </a:rPr>
-                        <a:t>53.0</a:t>
-                      </a:r>
-                      <a:endParaRPr lang="hr-HR" sz="1800" b="0" i="0" u="none" strike="noStrike">
+                        <a:rPr lang="nb-NO" sz="1800" u="none" strike="noStrike">
+                          <a:effectLst/>
+                        </a:rPr>
+                        <a:t>85.0</a:t>
+                      </a:r>
+                      <a:endParaRPr lang="nb-NO" sz="1800" b="0" i="0" u="none" strike="noStrike">
                         <a:solidFill>
                           <a:srgbClr val="000000"/>
                         </a:solidFill>
@@ -5375,18 +5804,6 @@
                         </a:rPr>
                         <a:t>jre</a:t>
                       </a:r>
-                      <a:r>
-                        <a:rPr lang="da-DK" sz="1800" u="none" strike="noStrike" dirty="0">
-                          <a:effectLst/>
-                        </a:rPr>
-                        <a:t> - 32 </a:t>
-                      </a:r>
-                      <a:r>
-                        <a:rPr lang="da-DK" sz="1800" u="none" strike="noStrike" dirty="0" err="1">
-                          <a:effectLst/>
-                        </a:rPr>
-                        <a:t>cds</a:t>
-                      </a:r>
                       <a:endParaRPr lang="da-DK" sz="1800" b="0" i="0" u="none" strike="noStrike" dirty="0">
                         <a:solidFill>
                           <a:srgbClr val="000000"/>
@@ -5401,82 +5818,7 @@
                   </a:tcPr>
                 </a:tc>
               </a:tr>
-              <a:tr h="310129">
-                <a:tc>
-                  <a:txBody>
-                    <a:bodyPr/>
-                    <a:lstStyle/>
-                    <a:p>
-                      <a:pPr algn="l" fontAlgn="b"/>
-                      <a:r>
-                        <a:rPr lang="en-US" sz="1800" u="none" strike="noStrike" dirty="0" err="1" smtClean="0">
-                          <a:effectLst/>
-                        </a:rPr>
-                        <a:t>helidon-se-modules-jre+cds</a:t>
-                      </a:r>
-                      <a:endParaRPr lang="en-US" sz="1800" b="0" i="0" u="none" strike="noStrike" dirty="0">
-                        <a:solidFill>
-                          <a:srgbClr val="000000"/>
-                        </a:solidFill>
-                        <a:effectLst/>
-                        <a:latin typeface="Calibri" charset="0"/>
-                      </a:endParaRPr>
-                    </a:p>
-                  </a:txBody>
-                  <a:tcPr marL="12700" marR="12700" marT="12700" marB="0" anchor="b">
-                    <a:noFill/>
-                  </a:tcPr>
-                </a:tc>
-                <a:tc>
-                  <a:txBody>
-                    <a:bodyPr/>
-                    <a:lstStyle/>
-                    <a:p>
-                      <a:pPr algn="r" fontAlgn="b"/>
-                      <a:r>
-                        <a:rPr lang="nb-NO" sz="1800" u="none" strike="noStrike">
-                          <a:effectLst/>
-                        </a:rPr>
-                        <a:t>0.519</a:t>
-                      </a:r>
-                      <a:endParaRPr lang="nb-NO" sz="1800" b="0" i="0" u="none" strike="noStrike">
-                        <a:solidFill>
-                          <a:srgbClr val="000000"/>
-                        </a:solidFill>
-                        <a:effectLst/>
-                        <a:latin typeface="Calibri" charset="0"/>
-                      </a:endParaRPr>
-                    </a:p>
-                  </a:txBody>
-                  <a:tcPr marL="12700" marR="12700" marT="12700" marB="0" anchor="b">
-                    <a:noFill/>
-                  </a:tcPr>
-                </a:tc>
-                <a:tc>
-                  <a:txBody>
-                    <a:bodyPr/>
-                    <a:lstStyle/>
-                    <a:p>
-                      <a:pPr algn="r" fontAlgn="b"/>
-                      <a:r>
-                        <a:rPr lang="nb-NO" sz="1800" u="none" strike="noStrike">
-                          <a:effectLst/>
-                        </a:rPr>
-                        <a:t>85.0</a:t>
-                      </a:r>
-                      <a:endParaRPr lang="nb-NO" sz="1800" b="0" i="0" u="none" strike="noStrike">
-                        <a:solidFill>
-                          <a:srgbClr val="000000"/>
-                        </a:solidFill>
-                        <a:effectLst/>
-                        <a:latin typeface="Calibri" charset="0"/>
-                      </a:endParaRPr>
-                    </a:p>
-                  </a:txBody>
-                  <a:tcPr marL="12700" marR="12700" marT="12700" marB="0" anchor="b">
-                    <a:noFill/>
-                  </a:tcPr>
-                </a:tc>
+              <a:tr h="311150">
                 <a:tc>
                   <a:txBody>
                     <a:bodyPr/>
@@ -5502,19 +5844,7 @@
                     <a:lstStyle/>
                     <a:p>
                       <a:pPr algn="l" fontAlgn="b"/>
-                      <a:r>
-                        <a:rPr lang="da-DK" sz="1800" u="none" strike="noStrike" dirty="0">
-                          <a:effectLst/>
-                        </a:rPr>
-                        <a:t>85 </a:t>
-                      </a:r>
-                      <a:r>
-                        <a:rPr lang="da-DK" sz="1800" u="none" strike="noStrike" dirty="0" err="1">
-                          <a:effectLst/>
-                        </a:rPr>
-                        <a:t>jre</a:t>
-                      </a:r>
-                      <a:endParaRPr lang="da-DK" sz="1800" b="0" i="0" u="none" strike="noStrike" dirty="0">
+                      <a:endParaRPr lang="en-US" sz="1800" b="0" i="0" u="none" strike="noStrike">
                         <a:solidFill>
                           <a:srgbClr val="000000"/>
                         </a:solidFill>
@@ -5527,8 +5857,63 @@
                     <a:noFill/>
                   </a:tcPr>
                 </a:tc>
-              </a:tr>
-              <a:tr h="310129">
+                <a:tc>
+                  <a:txBody>
+                    <a:bodyPr/>
+                    <a:lstStyle/>
+                    <a:p>
+                      <a:pPr algn="l" fontAlgn="b"/>
+                      <a:endParaRPr lang="en-US" sz="1800" b="0" i="0" u="none" strike="noStrike">
+                        <a:solidFill>
+                          <a:srgbClr val="000000"/>
+                        </a:solidFill>
+                        <a:effectLst/>
+                        <a:latin typeface="Calibri" charset="0"/>
+                      </a:endParaRPr>
+                    </a:p>
+                  </a:txBody>
+                  <a:tcPr marL="12700" marR="12700" marT="12700" marB="0" anchor="b">
+                    <a:noFill/>
+                  </a:tcPr>
+                </a:tc>
+                <a:tc>
+                  <a:txBody>
+                    <a:bodyPr/>
+                    <a:lstStyle/>
+                    <a:p>
+                      <a:pPr algn="l" fontAlgn="b"/>
+                      <a:endParaRPr lang="en-US" sz="1800" b="0" i="0" u="none" strike="noStrike">
+                        <a:solidFill>
+                          <a:srgbClr val="000000"/>
+                        </a:solidFill>
+                        <a:effectLst/>
+                        <a:latin typeface="Calibri" charset="0"/>
+                      </a:endParaRPr>
+                    </a:p>
+                  </a:txBody>
+                  <a:tcPr marL="12700" marR="12700" marT="12700" marB="0" anchor="b">
+                    <a:noFill/>
+                  </a:tcPr>
+                </a:tc>
+                <a:tc>
+                  <a:txBody>
+                    <a:bodyPr/>
+                    <a:lstStyle/>
+                    <a:p>
+                      <a:pPr algn="l" fontAlgn="b"/>
+                      <a:endParaRPr lang="en-US" sz="1800" b="0" i="0" u="none" strike="noStrike">
+                        <a:solidFill>
+                          <a:srgbClr val="000000"/>
+                        </a:solidFill>
+                        <a:effectLst/>
+                        <a:latin typeface="Calibri" charset="0"/>
+                      </a:endParaRPr>
+                    </a:p>
+                  </a:txBody>
+                  <a:tcPr marL="12700" marR="12700" marT="12700" marB="0" anchor="b">
+                    <a:noFill/>
+                  </a:tcPr>
+                </a:tc>
                 <a:tc>
                   <a:txBody>
                     <a:bodyPr/>
@@ -5548,6 +5933,108 @@
                     <a:noFill/>
                   </a:tcPr>
                 </a:tc>
+              </a:tr>
+              <a:tr h="311150">
+                <a:tc>
+                  <a:txBody>
+                    <a:bodyPr/>
+                    <a:lstStyle/>
+                    <a:p>
+                      <a:pPr algn="l" fontAlgn="b"/>
+                      <a:r>
+                        <a:rPr lang="en-US" sz="1800" u="none" strike="noStrike">
+                          <a:effectLst/>
+                        </a:rPr>
+                        <a:t>helidon-mp</a:t>
+                      </a:r>
+                      <a:endParaRPr lang="en-US" sz="1800" b="0" i="0" u="none" strike="noStrike">
+                        <a:solidFill>
+                          <a:srgbClr val="000000"/>
+                        </a:solidFill>
+                        <a:effectLst/>
+                        <a:latin typeface="Calibri" charset="0"/>
+                      </a:endParaRPr>
+                    </a:p>
+                  </a:txBody>
+                  <a:tcPr marL="12700" marR="12700" marT="12700" marB="0" anchor="b">
+                    <a:noFill/>
+                  </a:tcPr>
+                </a:tc>
+                <a:tc>
+                  <a:txBody>
+                    <a:bodyPr/>
+                    <a:lstStyle/>
+                    <a:p>
+                      <a:pPr algn="r" fontAlgn="b"/>
+                      <a:r>
+                        <a:rPr lang="hr-HR" sz="1800" u="none" strike="noStrike">
+                          <a:effectLst/>
+                        </a:rPr>
+                        <a:t>2.995</a:t>
+                      </a:r>
+                      <a:endParaRPr lang="hr-HR" sz="1800" b="0" i="0" u="none" strike="noStrike">
+                        <a:solidFill>
+                          <a:srgbClr val="000000"/>
+                        </a:solidFill>
+                        <a:effectLst/>
+                        <a:latin typeface="Calibri" charset="0"/>
+                      </a:endParaRPr>
+                    </a:p>
+                  </a:txBody>
+                  <a:tcPr marL="12700" marR="12700" marT="12700" marB="0" anchor="b">
+                    <a:noFill/>
+                  </a:tcPr>
+                </a:tc>
+                <a:tc>
+                  <a:txBody>
+                    <a:bodyPr/>
+                    <a:lstStyle/>
+                    <a:p>
+                      <a:pPr algn="r" fontAlgn="b"/>
+                      <a:r>
+                        <a:rPr lang="hr-HR" sz="1800" u="none" strike="noStrike">
+                          <a:effectLst/>
+                        </a:rPr>
+                        <a:t>216.6</a:t>
+                      </a:r>
+                      <a:endParaRPr lang="hr-HR" sz="1800" b="0" i="0" u="none" strike="noStrike">
+                        <a:solidFill>
+                          <a:srgbClr val="000000"/>
+                        </a:solidFill>
+                        <a:effectLst/>
+                        <a:latin typeface="Calibri" charset="0"/>
+                      </a:endParaRPr>
+                    </a:p>
+                  </a:txBody>
+                  <a:tcPr marL="12700" marR="12700" marT="12700" marB="0" anchor="b">
+                    <a:noFill/>
+                  </a:tcPr>
+                </a:tc>
+                <a:tc>
+                  <a:txBody>
+                    <a:bodyPr/>
+                    <a:lstStyle/>
+                    <a:p>
+                      <a:pPr algn="r" fontAlgn="b"/>
+                      <a:r>
+                        <a:rPr lang="nb-NO" sz="1800" u="none" strike="noStrike">
+                          <a:effectLst/>
+                        </a:rPr>
+                        <a:t>225.0</a:t>
+                      </a:r>
+                      <a:endParaRPr lang="nb-NO" sz="1800" b="0" i="0" u="none" strike="noStrike">
+                        <a:solidFill>
+                          <a:srgbClr val="000000"/>
+                        </a:solidFill>
+                        <a:effectLst/>
+                        <a:latin typeface="Calibri" charset="0"/>
+                      </a:endParaRPr>
+                    </a:p>
+                  </a:txBody>
+                  <a:tcPr marL="12700" marR="12700" marT="12700" marB="0" anchor="b">
+                    <a:noFill/>
+                  </a:tcPr>
+                </a:tc>
                 <a:tc>
                   <a:txBody>
                     <a:bodyPr/>
@@ -5573,7 +6060,145 @@
                     <a:lstStyle/>
                     <a:p>
                       <a:pPr algn="l" fontAlgn="b"/>
+                      <a:r>
+                        <a:rPr lang="cs-CZ" sz="1800" u="none" strike="noStrike" dirty="0">
+                          <a:effectLst/>
+                        </a:rPr>
+                        <a:t>279 </a:t>
+                      </a:r>
+                      <a:r>
+                        <a:rPr lang="cs-CZ" sz="1800" u="none" strike="noStrike" dirty="0" err="1">
+                          <a:effectLst/>
+                        </a:rPr>
+                        <a:t>jdk</a:t>
+                      </a:r>
+                      <a:r>
+                        <a:rPr lang="cs-CZ" sz="1800" u="none" strike="noStrike" dirty="0">
+                          <a:effectLst/>
+                        </a:rPr>
+                        <a:t> -74 </a:t>
+                      </a:r>
+                      <a:r>
+                        <a:rPr lang="cs-CZ" sz="1800" u="none" strike="noStrike" dirty="0" err="1">
+                          <a:effectLst/>
+                        </a:rPr>
+                        <a:t>jmod</a:t>
+                      </a:r>
+                      <a:r>
+                        <a:rPr lang="cs-CZ" sz="1800" u="none" strike="noStrike" dirty="0">
+                          <a:effectLst/>
+                        </a:rPr>
+                        <a:t> + 20 </a:t>
+                      </a:r>
+                      <a:r>
+                        <a:rPr lang="cs-CZ" sz="1800" u="none" strike="noStrike" dirty="0" err="1">
+                          <a:effectLst/>
+                        </a:rPr>
+                        <a:t>app</a:t>
+                      </a:r>
+                      <a:endParaRPr lang="cs-CZ" sz="1800" b="0" i="0" u="none" strike="noStrike" dirty="0">
+                        <a:solidFill>
+                          <a:srgbClr val="000000"/>
+                        </a:solidFill>
+                        <a:effectLst/>
+                        <a:latin typeface="Calibri" charset="0"/>
+                      </a:endParaRPr>
+                    </a:p>
+                  </a:txBody>
+                  <a:tcPr marL="12700" marR="12700" marT="12700" marB="0" anchor="b">
+                    <a:noFill/>
+                  </a:tcPr>
+                </a:tc>
+              </a:tr>
+              <a:tr h="311150">
+                <a:tc>
+                  <a:txBody>
+                    <a:bodyPr/>
+                    <a:lstStyle/>
+                    <a:p>
+                      <a:pPr algn="l" fontAlgn="b"/>
+                      <a:r>
+                        <a:rPr lang="en-US" sz="1800" u="none" strike="noStrike">
+                          <a:effectLst/>
+                        </a:rPr>
+                        <a:t>helidon-mp-cds</a:t>
+                      </a:r>
                       <a:endParaRPr lang="en-US" sz="1800" b="0" i="0" u="none" strike="noStrike">
+                        <a:solidFill>
+                          <a:srgbClr val="000000"/>
+                        </a:solidFill>
+                        <a:effectLst/>
+                        <a:latin typeface="Calibri" charset="0"/>
+                      </a:endParaRPr>
+                    </a:p>
+                  </a:txBody>
+                  <a:tcPr marL="12700" marR="12700" marT="12700" marB="0" anchor="b">
+                    <a:noFill/>
+                  </a:tcPr>
+                </a:tc>
+                <a:tc>
+                  <a:txBody>
+                    <a:bodyPr/>
+                    <a:lstStyle/>
+                    <a:p>
+                      <a:pPr algn="r" fontAlgn="b"/>
+                      <a:r>
+                        <a:rPr lang="hr-HR" sz="1800" u="none" strike="noStrike">
+                          <a:effectLst/>
+                        </a:rPr>
+                        <a:t>2.118</a:t>
+                      </a:r>
+                      <a:endParaRPr lang="hr-HR" sz="1800" b="0" i="0" u="none" strike="noStrike">
+                        <a:solidFill>
+                          <a:srgbClr val="000000"/>
+                        </a:solidFill>
+                        <a:effectLst/>
+                        <a:latin typeface="Calibri" charset="0"/>
+                      </a:endParaRPr>
+                    </a:p>
+                  </a:txBody>
+                  <a:tcPr marL="12700" marR="12700" marT="12700" marB="0" anchor="b">
+                    <a:noFill/>
+                  </a:tcPr>
+                </a:tc>
+                <a:tc>
+                  <a:txBody>
+                    <a:bodyPr/>
+                    <a:lstStyle/>
+                    <a:p>
+                      <a:pPr algn="r" fontAlgn="b"/>
+                      <a:r>
+                        <a:rPr lang="nb-NO" sz="1800" u="none" strike="noStrike">
+                          <a:effectLst/>
+                        </a:rPr>
+                        <a:t>190.5</a:t>
+                      </a:r>
+                      <a:endParaRPr lang="nb-NO" sz="1800" b="0" i="0" u="none" strike="noStrike">
+                        <a:solidFill>
+                          <a:srgbClr val="000000"/>
+                        </a:solidFill>
+                        <a:effectLst/>
+                        <a:latin typeface="Calibri" charset="0"/>
+                      </a:endParaRPr>
+                    </a:p>
+                  </a:txBody>
+                  <a:tcPr marL="12700" marR="12700" marT="12700" marB="0" anchor="b">
+                    <a:noFill/>
+                  </a:tcPr>
+                </a:tc>
+                <a:tc>
+                  <a:txBody>
+                    <a:bodyPr/>
+                    <a:lstStyle/>
+                    <a:p>
+                      <a:pPr algn="r" fontAlgn="b"/>
+                      <a:r>
+                        <a:rPr lang="is-IS" sz="1800" u="none" strike="noStrike">
+                          <a:effectLst/>
+                        </a:rPr>
+                        <a:t>285.0</a:t>
+                      </a:r>
+                      <a:endParaRPr lang="is-IS" sz="1800" b="0" i="0" u="none" strike="noStrike">
                         <a:solidFill>
                           <a:srgbClr val="000000"/>
                         </a:solidFill>
@@ -5611,6 +6236,42 @@
                     <a:lstStyle/>
                     <a:p>
                       <a:pPr algn="l" fontAlgn="b"/>
+                      <a:r>
+                        <a:rPr lang="en-US" sz="1800" u="none" strike="noStrike" dirty="0">
+                          <a:effectLst/>
+                        </a:rPr>
+                        <a:t>279 </a:t>
+                      </a:r>
+                      <a:r>
+                        <a:rPr lang="en-US" sz="1800" u="none" strike="noStrike" dirty="0" err="1">
+                          <a:effectLst/>
+                        </a:rPr>
+                        <a:t>jdk</a:t>
+                      </a:r>
+                      <a:r>
+                        <a:rPr lang="en-US" sz="1800" u="none" strike="noStrike" dirty="0">
+                          <a:effectLst/>
+                        </a:rPr>
+                        <a:t> -74 </a:t>
+                      </a:r>
+                      <a:r>
+                        <a:rPr lang="en-US" sz="1800" u="none" strike="noStrike" dirty="0" err="1">
+                          <a:effectLst/>
+                        </a:rPr>
+                        <a:t>jmod</a:t>
+                      </a:r>
+                      <a:r>
+                        <a:rPr lang="en-US" sz="1800" u="none" strike="noStrike" dirty="0">
+                          <a:effectLst/>
+                        </a:rPr>
+                        <a:t> + 20 app + 60 </a:t>
+                      </a:r>
+                      <a:r>
+                        <a:rPr lang="en-US" sz="1800" u="none" strike="noStrike" dirty="0" err="1">
+                          <a:effectLst/>
+                        </a:rPr>
+                        <a:t>cds</a:t>
+                      </a:r>
                       <a:endParaRPr lang="en-US" sz="1800" b="0" i="0" u="none" strike="noStrike" dirty="0">
                         <a:solidFill>
                           <a:srgbClr val="000000"/>
@@ -5625,7 +6286,7 @@
                   </a:tcPr>
                 </a:tc>
               </a:tr>
-              <a:tr h="310129">
+              <a:tr h="311150">
                 <a:tc>
                   <a:txBody>
                     <a:bodyPr/>
@@ -5633,351 +6294,19 @@
                     <a:p>
                       <a:pPr algn="l" fontAlgn="b"/>
                       <a:r>
-                        <a:rPr lang="en-US" sz="1800" u="none" strike="noStrike">
-                          <a:effectLst/>
-                        </a:rPr>
-                        <a:t>helidon-mp</a:t>
-                      </a:r>
-                      <a:endParaRPr lang="en-US" sz="1800" b="0" i="0" u="none" strike="noStrike">
-                        <a:solidFill>
-                          <a:srgbClr val="000000"/>
-                        </a:solidFill>
-                        <a:effectLst/>
-                        <a:latin typeface="Calibri" charset="0"/>
-                      </a:endParaRPr>
-                    </a:p>
-                  </a:txBody>
-                  <a:tcPr marL="12700" marR="12700" marT="12700" marB="0" anchor="b">
-                    <a:noFill/>
-                  </a:tcPr>
-                </a:tc>
-                <a:tc>
-                  <a:txBody>
-                    <a:bodyPr/>
-                    <a:lstStyle/>
-                    <a:p>
-                      <a:pPr algn="r" fontAlgn="b"/>
-                      <a:r>
-                        <a:rPr lang="hr-HR" sz="1800" u="none" strike="noStrike">
-                          <a:effectLst/>
-                        </a:rPr>
-                        <a:t>2.995</a:t>
-                      </a:r>
-                      <a:endParaRPr lang="hr-HR" sz="1800" b="0" i="0" u="none" strike="noStrike">
-                        <a:solidFill>
-                          <a:srgbClr val="000000"/>
-                        </a:solidFill>
-                        <a:effectLst/>
-                        <a:latin typeface="Calibri" charset="0"/>
-                      </a:endParaRPr>
-                    </a:p>
-                  </a:txBody>
-                  <a:tcPr marL="12700" marR="12700" marT="12700" marB="0" anchor="b">
-                    <a:noFill/>
-                  </a:tcPr>
-                </a:tc>
-                <a:tc>
-                  <a:txBody>
-                    <a:bodyPr/>
-                    <a:lstStyle/>
-                    <a:p>
-                      <a:pPr algn="r" fontAlgn="b"/>
-                      <a:r>
-                        <a:rPr lang="nb-NO" sz="1800" u="none" strike="noStrike">
-                          <a:effectLst/>
-                        </a:rPr>
-                        <a:t>225.0</a:t>
-                      </a:r>
-                      <a:endParaRPr lang="nb-NO" sz="1800" b="0" i="0" u="none" strike="noStrike">
-                        <a:solidFill>
-                          <a:srgbClr val="000000"/>
-                        </a:solidFill>
-                        <a:effectLst/>
-                        <a:latin typeface="Calibri" charset="0"/>
-                      </a:endParaRPr>
-                    </a:p>
-                  </a:txBody>
-                  <a:tcPr marL="12700" marR="12700" marT="12700" marB="0" anchor="b">
-                    <a:noFill/>
-                  </a:tcPr>
-                </a:tc>
-                <a:tc>
-                  <a:txBody>
-                    <a:bodyPr/>
-                    <a:lstStyle/>
-                    <a:p>
-                      <a:pPr algn="l" fontAlgn="b"/>
-                      <a:endParaRPr lang="en-US" sz="1800" b="0" i="0" u="none" strike="noStrike">
-                        <a:solidFill>
-                          <a:srgbClr val="000000"/>
-                        </a:solidFill>
-                        <a:effectLst/>
-                        <a:latin typeface="Calibri" charset="0"/>
-                      </a:endParaRPr>
-                    </a:p>
-                  </a:txBody>
-                  <a:tcPr marL="12700" marR="12700" marT="12700" marB="0" anchor="b">
-                    <a:noFill/>
-                  </a:tcPr>
-                </a:tc>
-                <a:tc>
-                  <a:txBody>
-                    <a:bodyPr/>
-                    <a:lstStyle/>
-                    <a:p>
-                      <a:pPr algn="l" fontAlgn="b"/>
-                      <a:r>
-                        <a:rPr lang="cs-CZ" sz="1800" u="none" strike="noStrike" dirty="0">
-                          <a:effectLst/>
-                        </a:rPr>
-                        <a:t>279 </a:t>
-                      </a:r>
-                      <a:r>
-                        <a:rPr lang="cs-CZ" sz="1800" u="none" strike="noStrike" dirty="0" err="1">
-                          <a:effectLst/>
-                        </a:rPr>
-                        <a:t>jdk</a:t>
-                      </a:r>
-                      <a:r>
-                        <a:rPr lang="cs-CZ" sz="1800" u="none" strike="noStrike" dirty="0">
-                          <a:effectLst/>
-                        </a:rPr>
-                        <a:t> -74 </a:t>
-                      </a:r>
-                      <a:r>
-                        <a:rPr lang="cs-CZ" sz="1800" u="none" strike="noStrike" dirty="0" err="1">
-                          <a:effectLst/>
-                        </a:rPr>
-                        <a:t>jmod</a:t>
-                      </a:r>
-                      <a:r>
-                        <a:rPr lang="cs-CZ" sz="1800" u="none" strike="noStrike" dirty="0">
-                          <a:effectLst/>
-                        </a:rPr>
-                        <a:t> + 20 </a:t>
-                      </a:r>
-                      <a:r>
-                        <a:rPr lang="cs-CZ" sz="1800" u="none" strike="noStrike" dirty="0" err="1" smtClean="0">
-                          <a:effectLst/>
-                        </a:rPr>
-                        <a:t>app</a:t>
-                      </a:r>
-                      <a:r>
-                        <a:rPr lang="cs-CZ" sz="1800" u="none" strike="noStrike" dirty="0" smtClean="0">
-                          <a:effectLst/>
-                        </a:rPr>
-                        <a:t> </a:t>
-                      </a:r>
-                      <a:r>
-                        <a:rPr lang="cs-CZ" sz="1800" u="none" strike="noStrike" dirty="0" err="1" smtClean="0">
-                          <a:effectLst/>
-                        </a:rPr>
-                        <a:t>jars</a:t>
-                      </a:r>
-                      <a:endParaRPr lang="cs-CZ" sz="1800" b="0" i="0" u="none" strike="noStrike" dirty="0">
-                        <a:solidFill>
-                          <a:srgbClr val="000000"/>
-                        </a:solidFill>
-                        <a:effectLst/>
-                        <a:latin typeface="Calibri" charset="0"/>
-                      </a:endParaRPr>
-                    </a:p>
-                  </a:txBody>
-                  <a:tcPr marL="12700" marR="12700" marT="12700" marB="0" anchor="b">
-                    <a:noFill/>
-                  </a:tcPr>
-                </a:tc>
-              </a:tr>
-              <a:tr h="310129">
-                <a:tc>
-                  <a:txBody>
-                    <a:bodyPr/>
-                    <a:lstStyle/>
-                    <a:p>
-                      <a:pPr algn="l" fontAlgn="b"/>
-                      <a:r>
-                        <a:rPr lang="en-US" sz="1800" u="none" strike="noStrike" dirty="0" err="1" smtClean="0">
-                          <a:effectLst/>
-                        </a:rPr>
-                        <a:t>helidon-mp+cds</a:t>
-                      </a:r>
-                      <a:endParaRPr lang="en-US" sz="1800" b="0" i="0" u="none" strike="noStrike" dirty="0">
-                        <a:solidFill>
-                          <a:srgbClr val="000000"/>
-                        </a:solidFill>
-                        <a:effectLst/>
-                        <a:latin typeface="Calibri" charset="0"/>
-                      </a:endParaRPr>
-                    </a:p>
-                  </a:txBody>
-                  <a:tcPr marL="12700" marR="12700" marT="12700" marB="0" anchor="b">
-                    <a:noFill/>
-                  </a:tcPr>
-                </a:tc>
-                <a:tc>
-                  <a:txBody>
-                    <a:bodyPr/>
-                    <a:lstStyle/>
-                    <a:p>
-                      <a:pPr algn="r" fontAlgn="b"/>
-                      <a:r>
-                        <a:rPr lang="hr-HR" sz="1800" u="none" strike="noStrike">
-                          <a:effectLst/>
-                        </a:rPr>
-                        <a:t>2.118</a:t>
-                      </a:r>
-                      <a:endParaRPr lang="hr-HR" sz="1800" b="0" i="0" u="none" strike="noStrike">
-                        <a:solidFill>
-                          <a:srgbClr val="000000"/>
-                        </a:solidFill>
-                        <a:effectLst/>
-                        <a:latin typeface="Calibri" charset="0"/>
-                      </a:endParaRPr>
-                    </a:p>
-                  </a:txBody>
-                  <a:tcPr marL="12700" marR="12700" marT="12700" marB="0" anchor="b">
-                    <a:noFill/>
-                  </a:tcPr>
-                </a:tc>
-                <a:tc>
-                  <a:txBody>
-                    <a:bodyPr/>
-                    <a:lstStyle/>
-                    <a:p>
-                      <a:pPr algn="r" fontAlgn="b"/>
-                      <a:r>
-                        <a:rPr lang="is-IS" sz="1800" u="none" strike="noStrike">
-                          <a:effectLst/>
-                        </a:rPr>
-                        <a:t>285.0</a:t>
-                      </a:r>
-                      <a:endParaRPr lang="is-IS" sz="1800" b="0" i="0" u="none" strike="noStrike">
-                        <a:solidFill>
-                          <a:srgbClr val="000000"/>
-                        </a:solidFill>
-                        <a:effectLst/>
-                        <a:latin typeface="Calibri" charset="0"/>
-                      </a:endParaRPr>
-                    </a:p>
-                  </a:txBody>
-                  <a:tcPr marL="12700" marR="12700" marT="12700" marB="0" anchor="b">
-                    <a:noFill/>
-                  </a:tcPr>
-                </a:tc>
-                <a:tc>
-                  <a:txBody>
-                    <a:bodyPr/>
-                    <a:lstStyle/>
-                    <a:p>
-                      <a:pPr algn="l" fontAlgn="b"/>
-                      <a:endParaRPr lang="en-US" sz="1800" b="0" i="0" u="none" strike="noStrike">
-                        <a:solidFill>
-                          <a:srgbClr val="000000"/>
-                        </a:solidFill>
-                        <a:effectLst/>
-                        <a:latin typeface="Calibri" charset="0"/>
-                      </a:endParaRPr>
-                    </a:p>
-                  </a:txBody>
-                  <a:tcPr marL="12700" marR="12700" marT="12700" marB="0" anchor="b">
-                    <a:noFill/>
-                  </a:tcPr>
-                </a:tc>
-                <a:tc>
-                  <a:txBody>
-                    <a:bodyPr/>
-                    <a:lstStyle/>
-                    <a:p>
-                      <a:pPr algn="l" fontAlgn="b"/>
-                      <a:r>
                         <a:rPr lang="en-US" sz="1800" u="none" strike="noStrike" dirty="0">
                           <a:effectLst/>
                         </a:rPr>
-                        <a:t>279 </a:t>
+                        <a:t>helidon-</a:t>
                       </a:r>
                       <a:r>
                         <a:rPr lang="en-US" sz="1800" u="none" strike="noStrike" dirty="0" err="1">
                           <a:effectLst/>
                         </a:rPr>
-                        <a:t>jdk</a:t>
+                        <a:t>mp</a:t>
                       </a:r>
                       <a:r>
                         <a:rPr lang="en-US" sz="1800" u="none" strike="noStrike" dirty="0">
-                          <a:effectLst/>
-                        </a:rPr>
-                        <a:t> -74 </a:t>
-                      </a:r>
-                      <a:r>
-                        <a:rPr lang="en-US" sz="1800" u="none" strike="noStrike" dirty="0" err="1">
-                          <a:effectLst/>
-                        </a:rPr>
-                        <a:t>jmod</a:t>
-                      </a:r>
-                      <a:r>
-                        <a:rPr lang="en-US" sz="1800" u="none" strike="noStrike" dirty="0">
-                          <a:effectLst/>
-                        </a:rPr>
-                        <a:t> + 20 app + 60 </a:t>
-                      </a:r>
-                      <a:r>
-                        <a:rPr lang="en-US" sz="1800" u="none" strike="noStrike" dirty="0" err="1">
-                          <a:effectLst/>
-                        </a:rPr>
-                        <a:t>cds</a:t>
-                      </a:r>
-                      <a:endParaRPr lang="en-US" sz="1800" b="0" i="0" u="none" strike="noStrike" dirty="0">
-                        <a:solidFill>
-                          <a:srgbClr val="000000"/>
-                        </a:solidFill>
-                        <a:effectLst/>
-                        <a:latin typeface="Calibri" charset="0"/>
-                      </a:endParaRPr>
-                    </a:p>
-                  </a:txBody>
-                  <a:tcPr marL="12700" marR="12700" marT="12700" marB="0" anchor="b">
-                    <a:noFill/>
-                  </a:tcPr>
-                </a:tc>
-              </a:tr>
-              <a:tr h="310129">
-                <a:tc>
-                  <a:txBody>
-                    <a:bodyPr/>
-                    <a:lstStyle/>
-                    <a:p>
-                      <a:pPr algn="l" fontAlgn="b"/>
-                      <a:r>
-                        <a:rPr lang="en-US" sz="1800" b="0" u="none" strike="noStrike" dirty="0" err="1">
-                          <a:solidFill>
-                            <a:schemeClr val="tx1"/>
-                          </a:solidFill>
-                          <a:effectLst/>
-                        </a:rPr>
-                        <a:t>helidon</a:t>
-                      </a:r>
-                      <a:r>
-                        <a:rPr lang="en-US" sz="1800" b="0" u="none" strike="noStrike" dirty="0">
-                          <a:solidFill>
-                            <a:schemeClr val="tx1"/>
-                          </a:solidFill>
-                          <a:effectLst/>
-                        </a:rPr>
-                        <a:t>-</a:t>
-                      </a:r>
-                      <a:r>
-                        <a:rPr lang="en-US" sz="1800" b="0" u="none" strike="noStrike" dirty="0" err="1">
-                          <a:solidFill>
-                            <a:schemeClr val="tx1"/>
-                          </a:solidFill>
-                          <a:effectLst/>
-                        </a:rPr>
-                        <a:t>mp</a:t>
-                      </a:r>
-                      <a:r>
-                        <a:rPr lang="en-US" sz="1800" b="0" u="none" strike="noStrike" dirty="0">
-                          <a:solidFill>
-                            <a:schemeClr val="tx1"/>
-                          </a:solidFill>
                           <a:effectLst/>
                         </a:rPr>
                         <a:t>-</a:t>
@@ -6058,6 +6387,249 @@
                     <a:p>
                       <a:pPr algn="r" fontAlgn="b"/>
                       <a:r>
+                        <a:rPr lang="is-IS" sz="1800" b="1" u="none" strike="noStrike" dirty="0">
+                          <a:solidFill>
+                            <a:schemeClr val="accent6">
+                              <a:lumMod val="75000"/>
+                            </a:schemeClr>
+                          </a:solidFill>
+                          <a:effectLst/>
+                        </a:rPr>
+                        <a:t>217.8</a:t>
+                      </a:r>
+                      <a:endParaRPr lang="is-IS" sz="1800" b="1" i="0" u="none" strike="noStrike" dirty="0">
+                        <a:solidFill>
+                          <a:schemeClr val="accent6">
+                            <a:lumMod val="75000"/>
+                          </a:schemeClr>
+                        </a:solidFill>
+                        <a:effectLst/>
+                        <a:latin typeface="Calibri" charset="0"/>
+                      </a:endParaRPr>
+                    </a:p>
+                  </a:txBody>
+                  <a:tcPr marL="12700" marR="12700" marT="12700" marB="0" anchor="b">
+                    <a:noFill/>
+                  </a:tcPr>
+                </a:tc>
+                <a:tc>
+                  <a:txBody>
+                    <a:bodyPr/>
+                    <a:lstStyle/>
+                    <a:p>
+                      <a:pPr algn="r" fontAlgn="b"/>
+                      <a:r>
+                        <a:rPr lang="hr-HR" sz="1800" b="1" u="none" strike="noStrike">
+                          <a:solidFill>
+                            <a:schemeClr val="accent6">
+                              <a:lumMod val="75000"/>
+                            </a:schemeClr>
+                          </a:solidFill>
+                          <a:effectLst/>
+                        </a:rPr>
+                        <a:t>66.0</a:t>
+                      </a:r>
+                      <a:endParaRPr lang="hr-HR" sz="1800" b="1" i="0" u="none" strike="noStrike">
+                        <a:solidFill>
+                          <a:schemeClr val="accent6">
+                            <a:lumMod val="75000"/>
+                          </a:schemeClr>
+                        </a:solidFill>
+                        <a:effectLst/>
+                        <a:latin typeface="Calibri" charset="0"/>
+                      </a:endParaRPr>
+                    </a:p>
+                  </a:txBody>
+                  <a:tcPr marL="12700" marR="12700" marT="12700" marB="0" anchor="b">
+                    <a:noFill/>
+                  </a:tcPr>
+                </a:tc>
+                <a:tc>
+                  <a:txBody>
+                    <a:bodyPr/>
+                    <a:lstStyle/>
+                    <a:p>
+                      <a:pPr algn="l" fontAlgn="b"/>
+                      <a:endParaRPr lang="en-US" sz="1800" b="1" i="0" u="none" strike="noStrike">
+                        <a:solidFill>
+                          <a:srgbClr val="548235"/>
+                        </a:solidFill>
+                        <a:effectLst/>
+                        <a:latin typeface="Calibri" charset="0"/>
+                      </a:endParaRPr>
+                    </a:p>
+                  </a:txBody>
+                  <a:tcPr marL="12700" marR="12700" marT="12700" marB="0" anchor="b">
+                    <a:noFill/>
+                  </a:tcPr>
+                </a:tc>
+                <a:tc>
+                  <a:txBody>
+                    <a:bodyPr/>
+                    <a:lstStyle/>
+                    <a:p>
+                      <a:pPr algn="l" fontAlgn="b"/>
+                      <a:r>
+                        <a:rPr lang="da-DK" sz="1800" u="none" strike="noStrike" dirty="0">
+                          <a:effectLst/>
+                        </a:rPr>
+                        <a:t>126 </a:t>
+                      </a:r>
+                      <a:r>
+                        <a:rPr lang="da-DK" sz="1800" u="none" strike="noStrike" dirty="0" err="1">
+                          <a:effectLst/>
+                        </a:rPr>
+                        <a:t>jre</a:t>
+                      </a:r>
+                      <a:r>
+                        <a:rPr lang="da-DK" sz="1800" u="none" strike="noStrike" dirty="0">
+                          <a:effectLst/>
+                        </a:rPr>
+                        <a:t> - 60 </a:t>
+                      </a:r>
+                      <a:r>
+                        <a:rPr lang="da-DK" sz="1800" u="none" strike="noStrike" dirty="0" err="1">
+                          <a:effectLst/>
+                        </a:rPr>
+                        <a:t>cds</a:t>
+                      </a:r>
+                      <a:endParaRPr lang="da-DK" sz="1800" b="1" i="0" u="none" strike="noStrike" dirty="0">
+                        <a:solidFill>
+                          <a:srgbClr val="548235"/>
+                        </a:solidFill>
+                        <a:effectLst/>
+                        <a:latin typeface="Calibri" charset="0"/>
+                      </a:endParaRPr>
+                    </a:p>
+                  </a:txBody>
+                  <a:tcPr marL="12700" marR="12700" marT="12700" marB="0" anchor="b">
+                    <a:noFill/>
+                  </a:tcPr>
+                </a:tc>
+              </a:tr>
+              <a:tr h="311150">
+                <a:tc>
+                  <a:txBody>
+                    <a:bodyPr/>
+                    <a:lstStyle/>
+                    <a:p>
+                      <a:pPr algn="l" fontAlgn="b"/>
+                      <a:r>
+                        <a:rPr lang="en-US" sz="1800" u="none" strike="noStrike" dirty="0">
+                          <a:effectLst/>
+                        </a:rPr>
+                        <a:t>helidon-</a:t>
+                      </a:r>
+                      <a:r>
+                        <a:rPr lang="en-US" sz="1800" u="none" strike="noStrike" dirty="0" err="1">
+                          <a:effectLst/>
+                        </a:rPr>
+                        <a:t>mp</a:t>
+                      </a:r>
+                      <a:r>
+                        <a:rPr lang="en-US" sz="1800" u="none" strike="noStrike" dirty="0">
+                          <a:effectLst/>
+                        </a:rPr>
+                        <a:t>-</a:t>
+                      </a:r>
+                      <a:r>
+                        <a:rPr lang="en-US" sz="1800" b="1" u="none" strike="noStrike" dirty="0">
+                          <a:solidFill>
+                            <a:schemeClr val="accent6">
+                              <a:lumMod val="75000"/>
+                            </a:schemeClr>
+                          </a:solidFill>
+                          <a:effectLst/>
+                        </a:rPr>
+                        <a:t>jars-</a:t>
+                      </a:r>
+                      <a:r>
+                        <a:rPr lang="en-US" sz="1800" b="1" u="none" strike="noStrike" dirty="0" err="1">
+                          <a:solidFill>
+                            <a:schemeClr val="accent6">
+                              <a:lumMod val="75000"/>
+                            </a:schemeClr>
+                          </a:solidFill>
+                          <a:effectLst/>
+                        </a:rPr>
+                        <a:t>jre</a:t>
+                      </a:r>
+                      <a:r>
+                        <a:rPr lang="en-US" sz="1800" b="1" u="none" strike="noStrike" dirty="0">
+                          <a:solidFill>
+                            <a:schemeClr val="accent6">
+                              <a:lumMod val="75000"/>
+                            </a:schemeClr>
+                          </a:solidFill>
+                          <a:effectLst/>
+                        </a:rPr>
+                        <a:t>-</a:t>
+                      </a:r>
+                      <a:r>
+                        <a:rPr lang="en-US" sz="1800" b="1" u="none" strike="noStrike" dirty="0" err="1">
+                          <a:solidFill>
+                            <a:schemeClr val="accent6">
+                              <a:lumMod val="75000"/>
+                            </a:schemeClr>
+                          </a:solidFill>
+                          <a:effectLst/>
+                        </a:rPr>
+                        <a:t>cds</a:t>
+                      </a:r>
+                      <a:endParaRPr lang="en-US" sz="1800" b="1" i="0" u="none" strike="noStrike" dirty="0">
+                        <a:solidFill>
+                          <a:schemeClr val="accent6">
+                            <a:lumMod val="75000"/>
+                          </a:schemeClr>
+                        </a:solidFill>
+                        <a:effectLst/>
+                        <a:latin typeface="Calibri" charset="0"/>
+                      </a:endParaRPr>
+                    </a:p>
+                  </a:txBody>
+                  <a:tcPr marL="12700" marR="12700" marT="12700" marB="0" anchor="b">
+                    <a:noFill/>
+                  </a:tcPr>
+                </a:tc>
+                <a:tc>
+                  <a:txBody>
+                    <a:bodyPr/>
+                    <a:lstStyle/>
+                    <a:p>
+                      <a:pPr algn="r" fontAlgn="b"/>
+                      <a:r>
+                        <a:rPr lang="hr-HR" sz="1800" b="1" u="none" strike="noStrike">
+                          <a:solidFill>
+                            <a:schemeClr val="accent6">
+                              <a:lumMod val="75000"/>
+                            </a:schemeClr>
+                          </a:solidFill>
+                          <a:effectLst/>
+                        </a:rPr>
+                        <a:t>2.093</a:t>
+                      </a:r>
+                      <a:endParaRPr lang="hr-HR" sz="1800" b="1" i="0" u="none" strike="noStrike">
+                        <a:solidFill>
+                          <a:schemeClr val="accent6">
+                            <a:lumMod val="75000"/>
+                          </a:schemeClr>
+                        </a:solidFill>
+                        <a:effectLst/>
+                        <a:latin typeface="Calibri" charset="0"/>
+                      </a:endParaRPr>
+                    </a:p>
+                  </a:txBody>
+                  <a:tcPr marL="12700" marR="12700" marT="12700" marB="0" anchor="b">
+                    <a:noFill/>
+                  </a:tcPr>
+                </a:tc>
+                <a:tc>
+                  <a:txBody>
+                    <a:bodyPr/>
+                    <a:lstStyle/>
+                    <a:p>
+                      <a:pPr algn="r" fontAlgn="b"/>
+                      <a:r>
                         <a:rPr lang="hr-HR" sz="1800" b="1" u="none" strike="noStrike" dirty="0">
                           <a:solidFill>
                             <a:schemeClr val="accent6">
@@ -6066,146 +6638,9 @@
                           </a:solidFill>
                           <a:effectLst/>
                         </a:rPr>
-                        <a:t>66.0</a:t>
+                        <a:t>193.0</a:t>
                       </a:r>
                       <a:endParaRPr lang="hr-HR" sz="1800" b="1" i="0" u="none" strike="noStrike" dirty="0">
-                        <a:solidFill>
-                          <a:schemeClr val="accent6">
-                            <a:lumMod val="75000"/>
-                          </a:schemeClr>
-                        </a:solidFill>
-                        <a:effectLst/>
-                        <a:latin typeface="Calibri" charset="0"/>
-                      </a:endParaRPr>
-                    </a:p>
-                  </a:txBody>
-                  <a:tcPr marL="12700" marR="12700" marT="12700" marB="0" anchor="b">
-                    <a:noFill/>
-                  </a:tcPr>
-                </a:tc>
-                <a:tc>
-                  <a:txBody>
-                    <a:bodyPr/>
-                    <a:lstStyle/>
-                    <a:p>
-                      <a:pPr algn="l" fontAlgn="b"/>
-                      <a:endParaRPr lang="en-US" sz="1800" b="1" i="0" u="none" strike="noStrike">
-                        <a:solidFill>
-                          <a:srgbClr val="548235"/>
-                        </a:solidFill>
-                        <a:effectLst/>
-                        <a:latin typeface="Calibri" charset="0"/>
-                      </a:endParaRPr>
-                    </a:p>
-                  </a:txBody>
-                  <a:tcPr marL="12700" marR="12700" marT="12700" marB="0" anchor="b">
-                    <a:noFill/>
-                  </a:tcPr>
-                </a:tc>
-                <a:tc>
-                  <a:txBody>
-                    <a:bodyPr/>
-                    <a:lstStyle/>
-                    <a:p>
-                      <a:pPr algn="l" fontAlgn="b"/>
-                      <a:r>
-                        <a:rPr lang="da-DK" sz="1800" u="none" strike="noStrike" dirty="0">
-                          <a:effectLst/>
-                        </a:rPr>
-                        <a:t>126 </a:t>
-                      </a:r>
-                      <a:r>
-                        <a:rPr lang="da-DK" sz="1800" u="none" strike="noStrike" dirty="0" err="1">
-                          <a:effectLst/>
-                        </a:rPr>
-                        <a:t>jre</a:t>
-                      </a:r>
-                      <a:r>
-                        <a:rPr lang="da-DK" sz="1800" u="none" strike="noStrike" dirty="0">
-                          <a:effectLst/>
-                        </a:rPr>
-                        <a:t> - 60 </a:t>
-                      </a:r>
-                      <a:r>
-                        <a:rPr lang="da-DK" sz="1800" u="none" strike="noStrike" dirty="0" err="1">
-                          <a:effectLst/>
-                        </a:rPr>
-                        <a:t>cds</a:t>
-                      </a:r>
-                      <a:endParaRPr lang="da-DK" sz="1800" b="1" i="0" u="none" strike="noStrike" dirty="0">
-                        <a:solidFill>
-                          <a:srgbClr val="548235"/>
-                        </a:solidFill>
-                        <a:effectLst/>
-                        <a:latin typeface="Calibri" charset="0"/>
-                      </a:endParaRPr>
-                    </a:p>
-                  </a:txBody>
-                  <a:tcPr marL="12700" marR="12700" marT="12700" marB="0" anchor="b">
-                    <a:noFill/>
-                  </a:tcPr>
-                </a:tc>
-              </a:tr>
-              <a:tr h="310129">
-                <a:tc>
-                  <a:txBody>
-                    <a:bodyPr/>
-                    <a:lstStyle/>
-                    <a:p>
-                      <a:pPr algn="l" fontAlgn="b"/>
-                      <a:r>
-                        <a:rPr lang="en-US" sz="1800" b="0" u="none" strike="noStrike" dirty="0" err="1" smtClean="0">
-                          <a:solidFill>
-                            <a:schemeClr val="tx1"/>
-                          </a:solidFill>
-                          <a:effectLst/>
-                        </a:rPr>
-                        <a:t>helidon-mp-</a:t>
-                      </a:r>
-                      <a:r>
-                        <a:rPr lang="en-US" sz="1800" b="1" u="none" strike="noStrike" dirty="0" err="1" smtClean="0">
-                          <a:solidFill>
-                            <a:schemeClr val="accent6">
-                              <a:lumMod val="75000"/>
-                            </a:schemeClr>
-                          </a:solidFill>
-                          <a:effectLst/>
-                        </a:rPr>
-                        <a:t>jars-jre+cds</a:t>
-                      </a:r>
-                      <a:endParaRPr lang="en-US" sz="1800" b="1" i="0" u="none" strike="noStrike" dirty="0">
-                        <a:solidFill>
-                          <a:schemeClr val="accent6">
-                            <a:lumMod val="75000"/>
-                          </a:schemeClr>
-                        </a:solidFill>
-                        <a:effectLst/>
-                        <a:latin typeface="Calibri" charset="0"/>
-                      </a:endParaRPr>
-                    </a:p>
-                  </a:txBody>
-                  <a:tcPr marL="12700" marR="12700" marT="12700" marB="0" anchor="b">
-                    <a:noFill/>
-                  </a:tcPr>
-                </a:tc>
-                <a:tc>
-                  <a:txBody>
-                    <a:bodyPr/>
-                    <a:lstStyle/>
-                    <a:p>
-                      <a:pPr algn="r" fontAlgn="b"/>
-                      <a:r>
-                        <a:rPr lang="hr-HR" sz="1800" b="1" u="none" strike="noStrike">
-                          <a:solidFill>
-                            <a:schemeClr val="accent6">
-                              <a:lumMod val="75000"/>
-                            </a:schemeClr>
-                          </a:solidFill>
-                          <a:effectLst/>
-                        </a:rPr>
-                        <a:t>2.093</a:t>
-                      </a:r>
-                      <a:endParaRPr lang="hr-HR" sz="1800" b="1" i="0" u="none" strike="noStrike">
                         <a:solidFill>
                           <a:schemeClr val="accent6">
                             <a:lumMod val="75000"/>
@@ -6303,7 +6738,7 @@
                   </a:tcPr>
                 </a:tc>
               </a:tr>
-              <a:tr h="310129">
+              <a:tr h="311150">
                 <a:tc>
                   <a:txBody>
                     <a:bodyPr/>
@@ -6311,30 +6746,12 @@
                     <a:p>
                       <a:pPr algn="l" fontAlgn="b"/>
                       <a:r>
-                        <a:rPr lang="en-US" sz="1800" u="none" strike="noStrike" dirty="0">
-                          <a:effectLst/>
-                        </a:rPr>
-                        <a:t>helidon-</a:t>
-                      </a:r>
-                      <a:r>
-                        <a:rPr lang="en-US" sz="1800" u="none" strike="noStrike" dirty="0" err="1">
-                          <a:effectLst/>
-                        </a:rPr>
-                        <a:t>mp</a:t>
-                      </a:r>
-                      <a:r>
-                        <a:rPr lang="en-US" sz="1800" u="none" strike="noStrike" dirty="0">
-                          <a:effectLst/>
-                        </a:rPr>
-                        <a:t>-modules-</a:t>
-                      </a:r>
-                      <a:r>
-                        <a:rPr lang="en-US" sz="1800" u="none" strike="noStrike" dirty="0" err="1">
-                          <a:effectLst/>
-                        </a:rPr>
-                        <a:t>jre</a:t>
-                      </a:r>
-                      <a:endParaRPr lang="en-US" sz="1800" b="0" i="0" u="none" strike="noStrike" dirty="0">
+                        <a:rPr lang="en-US" sz="1800" u="none" strike="noStrike">
+                          <a:effectLst/>
+                        </a:rPr>
+                        <a:t>helidon-mp-modules-jre</a:t>
+                      </a:r>
+                      <a:endParaRPr lang="en-US" sz="1800" b="0" i="0" u="none" strike="noStrike">
                         <a:solidFill>
                           <a:srgbClr val="000000"/>
                         </a:solidFill>
@@ -6358,6 +6775,31 @@
                           <a:effectLst/>
                         </a:rPr>
                         <a:t>2.691</a:t>
+                      </a:r>
+                      <a:endParaRPr lang="hr-HR" sz="1800" b="0" i="0" u="none" strike="noStrike">
+                        <a:solidFill>
+                          <a:srgbClr val="000000"/>
+                        </a:solidFill>
+                        <a:effectLst/>
+                        <a:latin typeface="Calibri" charset="0"/>
+                      </a:endParaRPr>
+                    </a:p>
+                  </a:txBody>
+                  <a:tcPr marL="12700" marR="12700" marT="12700" marB="0" anchor="b">
+                    <a:noFill/>
+                  </a:tcPr>
+                </a:tc>
+                <a:tc>
+                  <a:txBody>
+                    <a:bodyPr/>
+                    <a:lstStyle/>
+                    <a:p>
+                      <a:pPr algn="r" fontAlgn="b"/>
+                      <a:r>
+                        <a:rPr lang="hr-HR" sz="1800" u="none" strike="noStrike">
+                          <a:effectLst/>
+                        </a:rPr>
+                        <a:t>195.0</a:t>
                       </a:r>
                       <a:endParaRPr lang="hr-HR" sz="1800" b="0" i="0" u="none" strike="noStrike">
                         <a:solidFill>
@@ -6460,7 +6902,7 @@
                   </a:tcPr>
                 </a:tc>
               </a:tr>
-              <a:tr h="310129">
+              <a:tr h="311150">
                 <a:tc>
                   <a:txBody>
                     <a:bodyPr/>
@@ -6468,12 +6910,12 @@
                     <a:p>
                       <a:pPr algn="l" fontAlgn="b"/>
                       <a:r>
-                        <a:rPr lang="en-US" sz="1800" u="none" strike="noStrike" dirty="0" err="1" smtClean="0">
-                          <a:effectLst/>
-                        </a:rPr>
-                        <a:t>helidon-mp-modules-jre+cds</a:t>
-                      </a:r>
-                      <a:endParaRPr lang="en-US" sz="1800" b="0" i="0" u="none" strike="noStrike" dirty="0">
+                        <a:rPr lang="en-US" sz="1800" u="none" strike="noStrike">
+                          <a:effectLst/>
+                        </a:rPr>
+                        <a:t>helidon-mp-modules-jre-cds</a:t>
+                      </a:r>
+                      <a:endParaRPr lang="en-US" sz="1800" b="0" i="0" u="none" strike="noStrike">
                         <a:solidFill>
                           <a:srgbClr val="000000"/>
                         </a:solidFill>
@@ -6499,6 +6941,31 @@
                         <a:t>1.930</a:t>
                       </a:r>
                       <a:endParaRPr lang="nb-NO" sz="1800" b="0" i="0" u="none" strike="noStrike">
+                        <a:solidFill>
+                          <a:srgbClr val="000000"/>
+                        </a:solidFill>
+                        <a:effectLst/>
+                        <a:latin typeface="Calibri" charset="0"/>
+                      </a:endParaRPr>
+                    </a:p>
+                  </a:txBody>
+                  <a:tcPr marL="12700" marR="12700" marT="12700" marB="0" anchor="b">
+                    <a:noFill/>
+                  </a:tcPr>
+                </a:tc>
+                <a:tc>
+                  <a:txBody>
+                    <a:bodyPr/>
+                    <a:lstStyle/>
+                    <a:p>
+                      <a:pPr algn="r" fontAlgn="b"/>
+                      <a:r>
+                        <a:rPr lang="hr-HR" sz="1800" u="none" strike="noStrike">
+                          <a:effectLst/>
+                        </a:rPr>
+                        <a:t>192.3</a:t>
+                      </a:r>
+                      <a:endParaRPr lang="hr-HR" sz="1800" b="0" i="0" u="none" strike="noStrike">
                         <a:solidFill>
                           <a:srgbClr val="000000"/>
                         </a:solidFill>

</xml_diff>

<commit_message>
Added slide to deck. Added missing javadoc to JarsLinker classes.
</commit_message>
<xml_diff>
--- a/jlink/Helidon-JRE.pptx
+++ b/jlink/Helidon-JRE.pptx
@@ -5,16 +5,17 @@
     <p:sldMasterId id="2147483648" r:id="rId1"/>
   </p:sldMasterIdLst>
   <p:notesMasterIdLst>
-    <p:notesMasterId r:id="rId6"/>
+    <p:notesMasterId r:id="rId7"/>
   </p:notesMasterIdLst>
   <p:handoutMasterIdLst>
-    <p:handoutMasterId r:id="rId7"/>
+    <p:handoutMasterId r:id="rId8"/>
   </p:handoutMasterIdLst>
   <p:sldIdLst>
     <p:sldId id="256" r:id="rId2"/>
     <p:sldId id="290" r:id="rId3"/>
     <p:sldId id="291" r:id="rId4"/>
-    <p:sldId id="292" r:id="rId5"/>
+    <p:sldId id="293" r:id="rId5"/>
+    <p:sldId id="292" r:id="rId6"/>
   </p:sldIdLst>
   <p:sldSz cx="12192000" cy="6858000"/>
   <p:notesSz cx="6858000" cy="9144000"/>
@@ -861,6 +862,90 @@
           <a:bodyPr/>
           <a:lstStyle/>
           <a:p>
+            <a:endParaRPr lang="en-US" dirty="0"/>
+          </a:p>
+        </p:txBody>
+      </p:sp>
+      <p:sp>
+        <p:nvSpPr>
+          <p:cNvPr id="4" name="Slide Number Placeholder 3"/>
+          <p:cNvSpPr>
+            <a:spLocks noGrp="1"/>
+          </p:cNvSpPr>
+          <p:nvPr>
+            <p:ph type="sldNum" sz="quarter" idx="10"/>
+          </p:nvPr>
+        </p:nvSpPr>
+        <p:spPr/>
+        <p:txBody>
+          <a:bodyPr/>
+          <a:lstStyle/>
+          <a:p>
+            <a:fld id="{66081AE4-DB15-FD46-8118-3BA9E87CC2F8}" type="slidenum">
+              <a:rPr lang="en-US" smtClean="0"/>
+              <a:t>4</a:t>
+            </a:fld>
+            <a:endParaRPr lang="en-US"/>
+          </a:p>
+        </p:txBody>
+      </p:sp>
+    </p:spTree>
+    <p:extLst>
+      <p:ext uri="{BB962C8B-B14F-4D97-AF65-F5344CB8AC3E}">
+        <p14:creationId xmlns:p14="http://schemas.microsoft.com/office/powerpoint/2010/main" val="812427614"/>
+      </p:ext>
+    </p:extLst>
+  </p:cSld>
+  <p:clrMapOvr>
+    <a:masterClrMapping/>
+  </p:clrMapOvr>
+</p:notes>
+</file>
+
+<file path=ppt/notesSlides/notesSlide4.xml><?xml version="1.0" encoding="utf-8"?>
+<p:notes xmlns:a="http://schemas.openxmlformats.org/drawingml/2006/main" xmlns:r="http://schemas.openxmlformats.org/officeDocument/2006/relationships" xmlns:p="http://schemas.openxmlformats.org/presentationml/2006/main">
+  <p:cSld>
+    <p:spTree>
+      <p:nvGrpSpPr>
+        <p:cNvPr id="1" name=""/>
+        <p:cNvGrpSpPr/>
+        <p:nvPr/>
+      </p:nvGrpSpPr>
+      <p:grpSpPr>
+        <a:xfrm>
+          <a:off x="0" y="0"/>
+          <a:ext cx="0" cy="0"/>
+          <a:chOff x="0" y="0"/>
+          <a:chExt cx="0" cy="0"/>
+        </a:xfrm>
+      </p:grpSpPr>
+      <p:sp>
+        <p:nvSpPr>
+          <p:cNvPr id="2" name="Slide Image Placeholder 1"/>
+          <p:cNvSpPr>
+            <a:spLocks noGrp="1" noRot="1" noChangeAspect="1"/>
+          </p:cNvSpPr>
+          <p:nvPr>
+            <p:ph type="sldImg"/>
+          </p:nvPr>
+        </p:nvSpPr>
+        <p:spPr/>
+      </p:sp>
+      <p:sp>
+        <p:nvSpPr>
+          <p:cNvPr id="3" name="Notes Placeholder 2"/>
+          <p:cNvSpPr>
+            <a:spLocks noGrp="1"/>
+          </p:cNvSpPr>
+          <p:nvPr>
+            <p:ph type="body" idx="1"/>
+          </p:nvPr>
+        </p:nvSpPr>
+        <p:spPr/>
+        <p:txBody>
+          <a:bodyPr/>
+          <a:lstStyle/>
+          <a:p>
             <a:pPr marL="228600" indent="-228600">
               <a:buAutoNum type="arabicPeriod"/>
             </a:pPr>
@@ -1089,11 +1174,7 @@
             </a:r>
             <a:r>
               <a:rPr lang="en-US" sz="1050" baseline="0" dirty="0" smtClean="0"/>
-              <a:t>resident </a:t>
-            </a:r>
-            <a:r>
-              <a:rPr lang="en-US" sz="1050" baseline="0" smtClean="0"/>
-              <a:t>set size)</a:t>
+              <a:t>resident set size)</a:t>
             </a:r>
             <a:endParaRPr lang="en-US" dirty="0"/>
           </a:p>
@@ -1116,7 +1197,7 @@
           <a:p>
             <a:fld id="{66081AE4-DB15-FD46-8118-3BA9E87CC2F8}" type="slidenum">
               <a:rPr lang="en-US" smtClean="0"/>
-              <a:t>4</a:t>
+              <a:t>5</a:t>
             </a:fld>
             <a:endParaRPr lang="en-US"/>
           </a:p>
@@ -4437,7 +4518,7 @@
                 </a:solidFill>
                 <a:latin typeface="+mn-lt"/>
               </a:rPr>
-              <a:t>Results</a:t>
+              <a:t>Additional performance tweaks</a:t>
             </a:r>
             <a:endParaRPr lang="en-US" b="1" dirty="0">
               <a:solidFill>
@@ -4450,6 +4531,131 @@
       </p:sp>
       <p:sp>
         <p:nvSpPr>
+          <p:cNvPr id="3" name="Content Placeholder 2"/>
+          <p:cNvSpPr>
+            <a:spLocks noGrp="1"/>
+          </p:cNvSpPr>
+          <p:nvPr>
+            <p:ph idx="1"/>
+          </p:nvPr>
+        </p:nvSpPr>
+        <p:spPr/>
+        <p:txBody>
+          <a:bodyPr>
+            <a:normAutofit lnSpcReduction="10000"/>
+          </a:bodyPr>
+          <a:lstStyle/>
+          <a:p>
+            <a:pPr marL="0" indent="0">
+              <a:buNone/>
+            </a:pPr>
+            <a:r>
+              <a:rPr lang="en-US" dirty="0" smtClean="0"/>
+              <a:t>In both variants:</a:t>
+            </a:r>
+            <a:endParaRPr lang="is-IS" dirty="0" smtClean="0"/>
+          </a:p>
+          <a:p>
+            <a:pPr lvl="2"/>
+            <a:endParaRPr lang="en-US" dirty="0"/>
+          </a:p>
+          <a:p>
+            <a:pPr lvl="1"/>
+            <a:r>
+              <a:rPr lang="en-US" dirty="0"/>
+              <a:t>For an MP application, a </a:t>
+            </a:r>
+            <a:r>
+              <a:rPr lang="en-US" dirty="0" err="1"/>
+              <a:t>Jandex</a:t>
+            </a:r>
+            <a:r>
+              <a:rPr lang="en-US" dirty="0"/>
+              <a:t> index is added for any jars that have a </a:t>
+            </a:r>
+            <a:r>
+              <a:rPr lang="en-US" dirty="0" err="1">
+                <a:latin typeface="Consolas" charset="0"/>
+                <a:ea typeface="Consolas" charset="0"/>
+                <a:cs typeface="Consolas" charset="0"/>
+              </a:rPr>
+              <a:t>beans.xml</a:t>
+            </a:r>
+            <a:r>
+              <a:rPr lang="en-US" dirty="0"/>
+              <a:t> but </a:t>
+            </a:r>
+            <a:r>
+              <a:rPr lang="en-US" smtClean="0"/>
+              <a:t>are missing an </a:t>
+            </a:r>
+            <a:r>
+              <a:rPr lang="en-US" dirty="0" smtClean="0"/>
+              <a:t>index</a:t>
+            </a:r>
+            <a:endParaRPr lang="en-US" dirty="0"/>
+          </a:p>
+          <a:p>
+            <a:pPr lvl="2"/>
+            <a:r>
+              <a:rPr lang="en-US" dirty="0"/>
+              <a:t>Reduces CDI initialization overhead </a:t>
+            </a:r>
+          </a:p>
+          <a:p>
+            <a:pPr marL="0" indent="0">
+              <a:buNone/>
+            </a:pPr>
+            <a:endParaRPr lang="en-US" dirty="0" smtClean="0"/>
+          </a:p>
+          <a:p>
+            <a:pPr marL="0" indent="0">
+              <a:buNone/>
+            </a:pPr>
+            <a:r>
+              <a:rPr lang="en-US" dirty="0" smtClean="0"/>
+              <a:t>In the modules variant:</a:t>
+            </a:r>
+          </a:p>
+          <a:p>
+            <a:pPr marL="0" indent="0">
+              <a:buNone/>
+            </a:pPr>
+            <a:endParaRPr lang="en-US" dirty="0" smtClean="0"/>
+          </a:p>
+          <a:p>
+            <a:pPr lvl="1"/>
+            <a:r>
+              <a:rPr lang="en-US" dirty="0" smtClean="0"/>
+              <a:t>Startup classes are laid down in the modules image first, in boot order </a:t>
+            </a:r>
+          </a:p>
+          <a:p>
+            <a:pPr lvl="2"/>
+            <a:r>
+              <a:rPr lang="en-US" dirty="0" smtClean="0"/>
+              <a:t>Improves locality when paging the modules file</a:t>
+            </a:r>
+          </a:p>
+          <a:p>
+            <a:pPr lvl="2"/>
+            <a:r>
+              <a:rPr lang="en-US" dirty="0" smtClean="0"/>
+              <a:t>Matters when CDS is </a:t>
+            </a:r>
+            <a:r>
+              <a:rPr lang="en-US" i="1" dirty="0" smtClean="0"/>
+              <a:t>not</a:t>
+            </a:r>
+            <a:r>
+              <a:rPr lang="en-US" dirty="0" smtClean="0"/>
+              <a:t> used</a:t>
+            </a:r>
+          </a:p>
+        </p:txBody>
+      </p:sp>
+      <p:sp>
+        <p:nvSpPr>
           <p:cNvPr id="4" name="Footer Placeholder 3"/>
           <p:cNvSpPr>
             <a:spLocks noGrp="1"/>
@@ -4489,6 +4695,122 @@
             <a:fld id="{5955FB32-280C-4095-93C4-59948DB2ADAF}" type="slidenum">
               <a:rPr lang="en-US" smtClean="0"/>
               <a:t>4</a:t>
+            </a:fld>
+            <a:endParaRPr lang="en-US"/>
+          </a:p>
+        </p:txBody>
+      </p:sp>
+    </p:spTree>
+    <p:extLst>
+      <p:ext uri="{BB962C8B-B14F-4D97-AF65-F5344CB8AC3E}">
+        <p14:creationId xmlns:p14="http://schemas.microsoft.com/office/powerpoint/2010/main" val="1871414168"/>
+      </p:ext>
+    </p:extLst>
+  </p:cSld>
+  <p:clrMapOvr>
+    <a:masterClrMapping/>
+  </p:clrMapOvr>
+  <p:timing>
+    <p:tnLst>
+      <p:par>
+        <p:cTn id="1" dur="indefinite" restart="never" nodeType="tmRoot"/>
+      </p:par>
+    </p:tnLst>
+  </p:timing>
+</p:sld>
+</file>
+
+<file path=ppt/slides/slide5.xml><?xml version="1.0" encoding="utf-8"?>
+<p:sld xmlns:a="http://schemas.openxmlformats.org/drawingml/2006/main" xmlns:r="http://schemas.openxmlformats.org/officeDocument/2006/relationships" xmlns:p="http://schemas.openxmlformats.org/presentationml/2006/main">
+  <p:cSld>
+    <p:spTree>
+      <p:nvGrpSpPr>
+        <p:cNvPr id="1" name=""/>
+        <p:cNvGrpSpPr/>
+        <p:nvPr/>
+      </p:nvGrpSpPr>
+      <p:grpSpPr>
+        <a:xfrm>
+          <a:off x="0" y="0"/>
+          <a:ext cx="0" cy="0"/>
+          <a:chOff x="0" y="0"/>
+          <a:chExt cx="0" cy="0"/>
+        </a:xfrm>
+      </p:grpSpPr>
+      <p:sp>
+        <p:nvSpPr>
+          <p:cNvPr id="2" name="Title 1"/>
+          <p:cNvSpPr>
+            <a:spLocks noGrp="1"/>
+          </p:cNvSpPr>
+          <p:nvPr>
+            <p:ph type="title"/>
+          </p:nvPr>
+        </p:nvSpPr>
+        <p:spPr/>
+        <p:txBody>
+          <a:bodyPr/>
+          <a:lstStyle/>
+          <a:p>
+            <a:r>
+              <a:rPr lang="en-US" b="1" dirty="0" smtClean="0">
+                <a:solidFill>
+                  <a:srgbClr val="7F7F7F"/>
+                </a:solidFill>
+                <a:latin typeface="+mn-lt"/>
+              </a:rPr>
+              <a:t>Results</a:t>
+            </a:r>
+            <a:endParaRPr lang="en-US" b="1" dirty="0">
+              <a:solidFill>
+                <a:srgbClr val="7F7F7F"/>
+              </a:solidFill>
+              <a:latin typeface="+mn-lt"/>
+            </a:endParaRPr>
+          </a:p>
+        </p:txBody>
+      </p:sp>
+      <p:sp>
+        <p:nvSpPr>
+          <p:cNvPr id="4" name="Footer Placeholder 3"/>
+          <p:cNvSpPr>
+            <a:spLocks noGrp="1"/>
+          </p:cNvSpPr>
+          <p:nvPr>
+            <p:ph type="ftr" sz="quarter" idx="11"/>
+          </p:nvPr>
+        </p:nvSpPr>
+        <p:spPr/>
+        <p:txBody>
+          <a:bodyPr/>
+          <a:lstStyle/>
+          <a:p>
+            <a:r>
+              <a:rPr lang="en-US" dirty="0" smtClean="0"/>
+              <a:t>Copyright © 2019, Oracle and/or its affiliates. All rights reserved.  | Oracle Confidential – Internal/Restricted/Highly Restricted</a:t>
+            </a:r>
+            <a:endParaRPr lang="en-US" dirty="0"/>
+          </a:p>
+        </p:txBody>
+      </p:sp>
+      <p:sp>
+        <p:nvSpPr>
+          <p:cNvPr id="5" name="Slide Number Placeholder 4"/>
+          <p:cNvSpPr>
+            <a:spLocks noGrp="1"/>
+          </p:cNvSpPr>
+          <p:nvPr>
+            <p:ph type="sldNum" sz="quarter" idx="12"/>
+          </p:nvPr>
+        </p:nvSpPr>
+        <p:spPr/>
+        <p:txBody>
+          <a:bodyPr/>
+          <a:lstStyle/>
+          <a:p>
+            <a:fld id="{5955FB32-280C-4095-93C4-59948DB2ADAF}" type="slidenum">
+              <a:rPr lang="en-US" smtClean="0"/>
+              <a:t>5</a:t>
             </a:fld>
             <a:endParaRPr lang="en-US"/>
           </a:p>

</xml_diff>